<commit_message>
Modify display and document
</commit_message>
<xml_diff>
--- a/Boosting.pptx
+++ b/Boosting.pptx
@@ -28,12 +28,12 @@
     <p:sldId id="306" r:id="rId19"/>
     <p:sldId id="307" r:id="rId20"/>
     <p:sldId id="308" r:id="rId21"/>
-    <p:sldId id="309" r:id="rId22"/>
-    <p:sldId id="310" r:id="rId23"/>
-    <p:sldId id="296" r:id="rId24"/>
-    <p:sldId id="320" r:id="rId25"/>
-    <p:sldId id="319" r:id="rId26"/>
-    <p:sldId id="318" r:id="rId27"/>
+    <p:sldId id="296" r:id="rId22"/>
+    <p:sldId id="321" r:id="rId23"/>
+    <p:sldId id="320" r:id="rId24"/>
+    <p:sldId id="319" r:id="rId25"/>
+    <p:sldId id="318" r:id="rId26"/>
+    <p:sldId id="322" r:id="rId27"/>
     <p:sldId id="317" r:id="rId28"/>
     <p:sldId id="312" r:id="rId29"/>
     <p:sldId id="313" r:id="rId30"/>
@@ -139,7 +139,7 @@
   </p:defaultTextStyle>
   <p:extLst>
     <p:ext uri="{EFAFB233-063F-42B5-8137-9DF3F51BA10A}">
-      <p15:sldGuideLst xmlns:p15="http://schemas.microsoft.com/office/powerpoint/2012/main" xmlns="">
+      <p15:sldGuideLst xmlns="" xmlns:p15="http://schemas.microsoft.com/office/powerpoint/2012/main">
         <p15:guide id="1" orient="horz" pos="3868">
           <p15:clr>
             <a:srgbClr val="A4A3A4"/>
@@ -284,7 +284,7 @@
             <a:fld id="{F8252C7F-5FEC-2E4D-80AA-BF666F276660}" type="datetime1">
               <a:rPr lang="en-US" smtClean="0"/>
               <a:pPr/>
-              <a:t>6/11/2015</a:t>
+              <a:t>6/12/2015</a:t>
             </a:fld>
             <a:endParaRPr lang="en-US"/>
           </a:p>
@@ -360,7 +360,7 @@
     </p:spTree>
     <p:extLst>
       <p:ext uri="{BB962C8B-B14F-4D97-AF65-F5344CB8AC3E}">
-        <p14:creationId xmlns:p14="http://schemas.microsoft.com/office/powerpoint/2010/main" xmlns="" val="1411092301"/>
+        <p14:creationId xmlns="" xmlns:p14="http://schemas.microsoft.com/office/powerpoint/2010/main" val="1411092301"/>
       </p:ext>
     </p:extLst>
   </p:cSld>
@@ -452,7 +452,7 @@
             <a:fld id="{1939DE02-E791-1340-B4FF-3939EE33ADCD}" type="datetime1">
               <a:rPr lang="en-US" smtClean="0"/>
               <a:pPr/>
-              <a:t>6/11/2015</a:t>
+              <a:t>6/12/2015</a:t>
             </a:fld>
             <a:endParaRPr lang="en-US"/>
           </a:p>
@@ -621,7 +621,7 @@
     </p:spTree>
     <p:extLst>
       <p:ext uri="{BB962C8B-B14F-4D97-AF65-F5344CB8AC3E}">
-        <p14:creationId xmlns:p14="http://schemas.microsoft.com/office/powerpoint/2010/main" xmlns="" val="160240899"/>
+        <p14:creationId xmlns="" xmlns:p14="http://schemas.microsoft.com/office/powerpoint/2010/main" val="160240899"/>
       </p:ext>
     </p:extLst>
   </p:cSld>
@@ -751,7 +751,7 @@
           <a:blip r:embed="rId2">
             <a:extLst>
               <a:ext uri="{28A0092B-C50C-407E-A947-70E740481C1C}">
-                <a14:useLocalDpi xmlns:a14="http://schemas.microsoft.com/office/drawing/2010/main" xmlns="" val="0"/>
+                <a14:useLocalDpi xmlns="" xmlns:a14="http://schemas.microsoft.com/office/drawing/2010/main" val="0"/>
               </a:ext>
             </a:extLst>
           </a:blip>
@@ -772,7 +772,7 @@
     </p:spTree>
     <p:extLst>
       <p:ext uri="{BB962C8B-B14F-4D97-AF65-F5344CB8AC3E}">
-        <p14:creationId xmlns:p14="http://schemas.microsoft.com/office/powerpoint/2010/main" xmlns="" val="921680772"/>
+        <p14:creationId xmlns="" xmlns:p14="http://schemas.microsoft.com/office/powerpoint/2010/main" val="921680772"/>
       </p:ext>
     </p:extLst>
   </p:cSld>
@@ -802,7 +802,7 @@
     </p:spTree>
     <p:extLst>
       <p:ext uri="{BB962C8B-B14F-4D97-AF65-F5344CB8AC3E}">
-        <p14:creationId xmlns:p14="http://schemas.microsoft.com/office/powerpoint/2010/main" xmlns="" val="1551424100"/>
+        <p14:creationId xmlns="" xmlns:p14="http://schemas.microsoft.com/office/powerpoint/2010/main" val="1551424100"/>
       </p:ext>
     </p:extLst>
   </p:cSld>
@@ -932,7 +932,7 @@
     </p:spTree>
     <p:extLst>
       <p:ext uri="{BB962C8B-B14F-4D97-AF65-F5344CB8AC3E}">
-        <p14:creationId xmlns:p14="http://schemas.microsoft.com/office/powerpoint/2010/main" xmlns="" val="2725598606"/>
+        <p14:creationId xmlns="" xmlns:p14="http://schemas.microsoft.com/office/powerpoint/2010/main" val="2725598606"/>
       </p:ext>
     </p:extLst>
   </p:cSld>
@@ -1082,7 +1082,7 @@
     </p:spTree>
     <p:extLst>
       <p:ext uri="{BB962C8B-B14F-4D97-AF65-F5344CB8AC3E}">
-        <p14:creationId xmlns:p14="http://schemas.microsoft.com/office/powerpoint/2010/main" xmlns="" val="3479517975"/>
+        <p14:creationId xmlns="" xmlns:p14="http://schemas.microsoft.com/office/powerpoint/2010/main" val="3479517975"/>
       </p:ext>
     </p:extLst>
   </p:cSld>
@@ -1232,7 +1232,7 @@
     </p:spTree>
     <p:extLst>
       <p:ext uri="{BB962C8B-B14F-4D97-AF65-F5344CB8AC3E}">
-        <p14:creationId xmlns:p14="http://schemas.microsoft.com/office/powerpoint/2010/main" xmlns="" val="3246921271"/>
+        <p14:creationId xmlns="" xmlns:p14="http://schemas.microsoft.com/office/powerpoint/2010/main" val="3246921271"/>
       </p:ext>
     </p:extLst>
   </p:cSld>
@@ -1390,7 +1390,7 @@
     </p:spTree>
     <p:extLst>
       <p:ext uri="{BB962C8B-B14F-4D97-AF65-F5344CB8AC3E}">
-        <p14:creationId xmlns:p14="http://schemas.microsoft.com/office/powerpoint/2010/main" xmlns="" val="3015080783"/>
+        <p14:creationId xmlns="" xmlns:p14="http://schemas.microsoft.com/office/powerpoint/2010/main" val="3015080783"/>
       </p:ext>
     </p:extLst>
   </p:cSld>
@@ -1507,7 +1507,7 @@
     </p:spTree>
     <p:extLst>
       <p:ext uri="{BB962C8B-B14F-4D97-AF65-F5344CB8AC3E}">
-        <p14:creationId xmlns:p14="http://schemas.microsoft.com/office/powerpoint/2010/main" xmlns="" val="2098243185"/>
+        <p14:creationId xmlns="" xmlns:p14="http://schemas.microsoft.com/office/powerpoint/2010/main" val="2098243185"/>
       </p:ext>
     </p:extLst>
   </p:cSld>
@@ -1573,7 +1573,7 @@
     </p:spTree>
     <p:extLst>
       <p:ext uri="{BB962C8B-B14F-4D97-AF65-F5344CB8AC3E}">
-        <p14:creationId xmlns:p14="http://schemas.microsoft.com/office/powerpoint/2010/main" xmlns="" val="4200364697"/>
+        <p14:creationId xmlns="" xmlns:p14="http://schemas.microsoft.com/office/powerpoint/2010/main" val="4200364697"/>
       </p:ext>
     </p:extLst>
   </p:cSld>
@@ -1639,7 +1639,7 @@
     </p:spTree>
     <p:extLst>
       <p:ext uri="{BB962C8B-B14F-4D97-AF65-F5344CB8AC3E}">
-        <p14:creationId xmlns:p14="http://schemas.microsoft.com/office/powerpoint/2010/main" xmlns="" val="930438236"/>
+        <p14:creationId xmlns="" xmlns:p14="http://schemas.microsoft.com/office/powerpoint/2010/main" val="930438236"/>
       </p:ext>
     </p:extLst>
   </p:cSld>
@@ -1705,7 +1705,7 @@
     </p:spTree>
     <p:extLst>
       <p:ext uri="{BB962C8B-B14F-4D97-AF65-F5344CB8AC3E}">
-        <p14:creationId xmlns:p14="http://schemas.microsoft.com/office/powerpoint/2010/main" xmlns="" val="726771096"/>
+        <p14:creationId xmlns="" xmlns:p14="http://schemas.microsoft.com/office/powerpoint/2010/main" val="726771096"/>
       </p:ext>
     </p:extLst>
   </p:cSld>
@@ -1766,7 +1766,7 @@
             <a:blip r:embed="rId12">
               <a:extLst>
                 <a:ext uri="{28A0092B-C50C-407E-A947-70E740481C1C}">
-                  <a14:useLocalDpi xmlns:a14="http://schemas.microsoft.com/office/drawing/2010/main" xmlns="" val="0"/>
+                  <a14:useLocalDpi xmlns="" xmlns:a14="http://schemas.microsoft.com/office/drawing/2010/main" val="0"/>
                 </a:ext>
               </a:extLst>
             </a:blip>
@@ -1796,7 +1796,7 @@
             <a:blip r:embed="rId13">
               <a:extLst>
                 <a:ext uri="{28A0092B-C50C-407E-A947-70E740481C1C}">
-                  <a14:useLocalDpi xmlns:a14="http://schemas.microsoft.com/office/drawing/2010/main" xmlns="" val="0"/>
+                  <a14:useLocalDpi xmlns="" xmlns:a14="http://schemas.microsoft.com/office/drawing/2010/main" val="0"/>
                 </a:ext>
               </a:extLst>
             </a:blip>
@@ -1920,7 +1920,7 @@
     </p:spTree>
     <p:extLst>
       <p:ext uri="{BB962C8B-B14F-4D97-AF65-F5344CB8AC3E}">
-        <p14:creationId xmlns:p14="http://schemas.microsoft.com/office/powerpoint/2010/main" xmlns="" val="950083170"/>
+        <p14:creationId xmlns="" xmlns:p14="http://schemas.microsoft.com/office/powerpoint/2010/main" val="950083170"/>
       </p:ext>
     </p:extLst>
   </p:cSld>
@@ -2312,7 +2312,7 @@
     </p:spTree>
     <p:extLst>
       <p:ext uri="{BB962C8B-B14F-4D97-AF65-F5344CB8AC3E}">
-        <p14:creationId xmlns:p14="http://schemas.microsoft.com/office/powerpoint/2010/main" xmlns="" val="3730043343"/>
+        <p14:creationId xmlns="" xmlns:p14="http://schemas.microsoft.com/office/powerpoint/2010/main" val="3730043343"/>
       </p:ext>
     </p:extLst>
   </p:cSld>
@@ -2466,7 +2466,7 @@
           <a:blip r:embed="rId2">
             <a:extLst>
               <a:ext uri="{28A0092B-C50C-407E-A947-70E740481C1C}">
-                <a14:useLocalDpi xmlns:a14="http://schemas.microsoft.com/office/drawing/2010/main" xmlns="" val="0"/>
+                <a14:useLocalDpi xmlns="" xmlns:a14="http://schemas.microsoft.com/office/drawing/2010/main" val="0"/>
               </a:ext>
             </a:extLst>
           </a:blip>
@@ -2489,14 +2489,14 @@
           </a:ln>
           <a:extLst>
             <a:ext uri="{909E8E84-426E-40DD-AFC4-6F175D3DCCD1}">
-              <a14:hiddenFill xmlns:a14="http://schemas.microsoft.com/office/drawing/2010/main" xmlns="">
+              <a14:hiddenFill xmlns="" xmlns:a14="http://schemas.microsoft.com/office/drawing/2010/main">
                 <a:solidFill>
                   <a:schemeClr val="accent1"/>
                 </a:solidFill>
               </a14:hiddenFill>
             </a:ext>
             <a:ext uri="{91240B29-F687-4F45-9708-019B960494DF}">
-              <a14:hiddenLine xmlns:a14="http://schemas.microsoft.com/office/drawing/2010/main" xmlns="" w="9525">
+              <a14:hiddenLine xmlns="" xmlns:a14="http://schemas.microsoft.com/office/drawing/2010/main" w="9525">
                 <a:solidFill>
                   <a:schemeClr val="tx1"/>
                 </a:solidFill>
@@ -2988,7 +2988,7 @@
     </p:spTree>
     <p:extLst>
       <p:ext uri="{BB962C8B-B14F-4D97-AF65-F5344CB8AC3E}">
-        <p14:creationId xmlns:p14="http://schemas.microsoft.com/office/powerpoint/2010/main" xmlns="" val="3598515457"/>
+        <p14:creationId xmlns="" xmlns:p14="http://schemas.microsoft.com/office/powerpoint/2010/main" val="3598515457"/>
       </p:ext>
     </p:extLst>
   </p:cSld>
@@ -3455,7 +3455,7 @@
           <a:blip r:embed="rId2">
             <a:extLst>
               <a:ext uri="{28A0092B-C50C-407E-A947-70E740481C1C}">
-                <a14:useLocalDpi xmlns:a14="http://schemas.microsoft.com/office/drawing/2010/main" xmlns="" val="0"/>
+                <a14:useLocalDpi xmlns="" xmlns:a14="http://schemas.microsoft.com/office/drawing/2010/main" val="0"/>
               </a:ext>
             </a:extLst>
           </a:blip>
@@ -3478,14 +3478,14 @@
           </a:ln>
           <a:extLst>
             <a:ext uri="{909E8E84-426E-40DD-AFC4-6F175D3DCCD1}">
-              <a14:hiddenFill xmlns:a14="http://schemas.microsoft.com/office/drawing/2010/main" xmlns="">
+              <a14:hiddenFill xmlns="" xmlns:a14="http://schemas.microsoft.com/office/drawing/2010/main">
                 <a:solidFill>
                   <a:schemeClr val="accent1"/>
                 </a:solidFill>
               </a14:hiddenFill>
             </a:ext>
             <a:ext uri="{91240B29-F687-4F45-9708-019B960494DF}">
-              <a14:hiddenLine xmlns:a14="http://schemas.microsoft.com/office/drawing/2010/main" xmlns="" w="9525">
+              <a14:hiddenLine xmlns="" xmlns:a14="http://schemas.microsoft.com/office/drawing/2010/main" w="9525">
                 <a:solidFill>
                   <a:schemeClr val="tx1"/>
                 </a:solidFill>
@@ -3500,7 +3500,7 @@
     </p:spTree>
     <p:extLst>
       <p:ext uri="{BB962C8B-B14F-4D97-AF65-F5344CB8AC3E}">
-        <p14:creationId xmlns:p14="http://schemas.microsoft.com/office/powerpoint/2010/main" xmlns="" val="2280124998"/>
+        <p14:creationId xmlns="" xmlns:p14="http://schemas.microsoft.com/office/powerpoint/2010/main" val="2280124998"/>
       </p:ext>
     </p:extLst>
   </p:cSld>
@@ -4178,7 +4178,7 @@
     </p:spTree>
     <p:extLst>
       <p:ext uri="{BB962C8B-B14F-4D97-AF65-F5344CB8AC3E}">
-        <p14:creationId xmlns:p14="http://schemas.microsoft.com/office/powerpoint/2010/main" xmlns="" val="336112017"/>
+        <p14:creationId xmlns="" xmlns:p14="http://schemas.microsoft.com/office/powerpoint/2010/main" val="336112017"/>
       </p:ext>
     </p:extLst>
   </p:cSld>
@@ -4513,7 +4513,7 @@
     </p:spTree>
     <p:extLst>
       <p:ext uri="{BB962C8B-B14F-4D97-AF65-F5344CB8AC3E}">
-        <p14:creationId xmlns:p14="http://schemas.microsoft.com/office/powerpoint/2010/main" xmlns="" val="3831115768"/>
+        <p14:creationId xmlns="" xmlns:p14="http://schemas.microsoft.com/office/powerpoint/2010/main" val="3831115768"/>
       </p:ext>
     </p:extLst>
   </p:cSld>
@@ -4862,7 +4862,7 @@
     </p:spTree>
     <p:extLst>
       <p:ext uri="{BB962C8B-B14F-4D97-AF65-F5344CB8AC3E}">
-        <p14:creationId xmlns:p14="http://schemas.microsoft.com/office/powerpoint/2010/main" xmlns="" val="3620790817"/>
+        <p14:creationId xmlns="" xmlns:p14="http://schemas.microsoft.com/office/powerpoint/2010/main" val="3620790817"/>
       </p:ext>
     </p:extLst>
   </p:cSld>
@@ -4984,7 +4984,7 @@
           <a:blip r:embed="rId2">
             <a:extLst>
               <a:ext uri="{28A0092B-C50C-407E-A947-70E740481C1C}">
-                <a14:useLocalDpi xmlns:a14="http://schemas.microsoft.com/office/drawing/2010/main" xmlns="" val="0"/>
+                <a14:useLocalDpi xmlns="" xmlns:a14="http://schemas.microsoft.com/office/drawing/2010/main" val="0"/>
               </a:ext>
             </a:extLst>
           </a:blip>
@@ -5007,14 +5007,14 @@
           </a:ln>
           <a:extLst>
             <a:ext uri="{909E8E84-426E-40DD-AFC4-6F175D3DCCD1}">
-              <a14:hiddenFill xmlns:a14="http://schemas.microsoft.com/office/drawing/2010/main" xmlns="">
+              <a14:hiddenFill xmlns="" xmlns:a14="http://schemas.microsoft.com/office/drawing/2010/main">
                 <a:solidFill>
                   <a:schemeClr val="accent1"/>
                 </a:solidFill>
               </a14:hiddenFill>
             </a:ext>
             <a:ext uri="{91240B29-F687-4F45-9708-019B960494DF}">
-              <a14:hiddenLine xmlns:a14="http://schemas.microsoft.com/office/drawing/2010/main" xmlns="" w="9525">
+              <a14:hiddenLine xmlns="" xmlns:a14="http://schemas.microsoft.com/office/drawing/2010/main" w="9525">
                 <a:solidFill>
                   <a:schemeClr val="tx1"/>
                 </a:solidFill>
@@ -5038,7 +5038,7 @@
           <a:blip r:embed="rId3">
             <a:extLst>
               <a:ext uri="{28A0092B-C50C-407E-A947-70E740481C1C}">
-                <a14:useLocalDpi xmlns:a14="http://schemas.microsoft.com/office/drawing/2010/main" xmlns="" val="0"/>
+                <a14:useLocalDpi xmlns="" xmlns:a14="http://schemas.microsoft.com/office/drawing/2010/main" val="0"/>
               </a:ext>
             </a:extLst>
           </a:blip>
@@ -5061,14 +5061,14 @@
           </a:ln>
           <a:extLst>
             <a:ext uri="{909E8E84-426E-40DD-AFC4-6F175D3DCCD1}">
-              <a14:hiddenFill xmlns:a14="http://schemas.microsoft.com/office/drawing/2010/main" xmlns="">
+              <a14:hiddenFill xmlns="" xmlns:a14="http://schemas.microsoft.com/office/drawing/2010/main">
                 <a:solidFill>
                   <a:schemeClr val="accent1"/>
                 </a:solidFill>
               </a14:hiddenFill>
             </a:ext>
             <a:ext uri="{91240B29-F687-4F45-9708-019B960494DF}">
-              <a14:hiddenLine xmlns:a14="http://schemas.microsoft.com/office/drawing/2010/main" xmlns="" w="9525">
+              <a14:hiddenLine xmlns="" xmlns:a14="http://schemas.microsoft.com/office/drawing/2010/main" w="9525">
                 <a:solidFill>
                   <a:schemeClr val="tx1"/>
                 </a:solidFill>
@@ -5083,7 +5083,7 @@
     </p:spTree>
     <p:extLst>
       <p:ext uri="{BB962C8B-B14F-4D97-AF65-F5344CB8AC3E}">
-        <p14:creationId xmlns:p14="http://schemas.microsoft.com/office/powerpoint/2010/main" xmlns="" val="2098547948"/>
+        <p14:creationId xmlns="" xmlns:p14="http://schemas.microsoft.com/office/powerpoint/2010/main" val="2098547948"/>
       </p:ext>
     </p:extLst>
   </p:cSld>
@@ -5580,7 +5580,7 @@
     </p:spTree>
     <p:extLst>
       <p:ext uri="{BB962C8B-B14F-4D97-AF65-F5344CB8AC3E}">
-        <p14:creationId xmlns:p14="http://schemas.microsoft.com/office/powerpoint/2010/main" xmlns="" val="3400813862"/>
+        <p14:creationId xmlns="" xmlns:p14="http://schemas.microsoft.com/office/powerpoint/2010/main" val="3400813862"/>
       </p:ext>
     </p:extLst>
   </p:cSld>
@@ -6013,7 +6013,7 @@
     </p:spTree>
     <p:extLst>
       <p:ext uri="{BB962C8B-B14F-4D97-AF65-F5344CB8AC3E}">
-        <p14:creationId xmlns:p14="http://schemas.microsoft.com/office/powerpoint/2010/main" xmlns="" val="478957399"/>
+        <p14:creationId xmlns="" xmlns:p14="http://schemas.microsoft.com/office/powerpoint/2010/main" val="478957399"/>
       </p:ext>
     </p:extLst>
   </p:cSld>
@@ -6060,949 +6060,6 @@
         <p:spPr>
           <a:xfrm>
             <a:off x="228600" y="986319"/>
-            <a:ext cx="8689622" cy="3988784"/>
-          </a:xfrm>
-        </p:spPr>
-        <p:txBody>
-          <a:bodyPr/>
-          <a:lstStyle/>
-          <a:p>
-            <a:pPr marL="342900" indent="-342900">
-              <a:buFont typeface="Arial" panose="020B0604020202020204" pitchFamily="34" charset="0"/>
-              <a:buChar char="•"/>
-            </a:pPr>
-            <a:r>
-              <a:rPr lang="en-US" altLang="zh-TW" sz="2400" dirty="0">
-                <a:latin typeface="+mj-lt"/>
-              </a:rPr>
-              <a:t>Factory Prototype </a:t>
-            </a:r>
-            <a:r>
-              <a:rPr lang="en-US" altLang="zh-TW" sz="2400" dirty="0" smtClean="0">
-                <a:latin typeface="+mj-lt"/>
-              </a:rPr>
-              <a:t>Phase</a:t>
-            </a:r>
-          </a:p>
-          <a:p>
-            <a:pPr marL="1200150" lvl="1" indent="-457200">
-              <a:buFont typeface="Wingdings" panose="05000000000000000000" pitchFamily="2" charset="2"/>
-              <a:buChar char="Ø"/>
-            </a:pPr>
-            <a:r>
-              <a:rPr lang="en-US" altLang="zh-TW" sz="2000" dirty="0" smtClean="0">
-                <a:solidFill>
-                  <a:srgbClr val="FF0000"/>
-                </a:solidFill>
-                <a:latin typeface="+mj-lt"/>
-              </a:rPr>
-              <a:t>Goal - </a:t>
-            </a:r>
-            <a:r>
-              <a:rPr lang="en-US" altLang="zh-TW" sz="2000" dirty="0">
-                <a:solidFill>
-                  <a:srgbClr val="FF0000"/>
-                </a:solidFill>
-                <a:latin typeface="+mj-lt"/>
-              </a:rPr>
-              <a:t>Verify the design and manufacturability of the product</a:t>
-            </a:r>
-            <a:endParaRPr lang="en-US" altLang="zh-TW" sz="2000" dirty="0" smtClean="0">
-              <a:solidFill>
-                <a:srgbClr val="FF0000"/>
-              </a:solidFill>
-              <a:latin typeface="+mj-lt"/>
-            </a:endParaRPr>
-          </a:p>
-          <a:p>
-            <a:pPr marL="1085850" lvl="1" indent="-342900">
-              <a:buFont typeface="Wingdings" panose="05000000000000000000" pitchFamily="2" charset="2"/>
-              <a:buChar char="Ø"/>
-            </a:pPr>
-            <a:r>
-              <a:rPr lang="en-US" altLang="zh-TW" sz="2000" dirty="0">
-                <a:latin typeface="+mj-lt"/>
-              </a:rPr>
-              <a:t>H</a:t>
-            </a:r>
-            <a:r>
-              <a:rPr lang="en-US" altLang="zh-TW" sz="2000" dirty="0" smtClean="0">
-                <a:latin typeface="+mj-lt"/>
-              </a:rPr>
-              <a:t>ardware </a:t>
-            </a:r>
-            <a:r>
-              <a:rPr lang="en-US" altLang="zh-TW" sz="2000" dirty="0">
-                <a:latin typeface="+mj-lt"/>
-              </a:rPr>
-              <a:t>design will become complete and frozen</a:t>
-            </a:r>
-            <a:endParaRPr lang="zh-TW" altLang="zh-TW" sz="2000" dirty="0">
-              <a:latin typeface="+mj-lt"/>
-            </a:endParaRPr>
-          </a:p>
-          <a:p>
-            <a:pPr marL="1085850" lvl="1" indent="-342900">
-              <a:buFont typeface="Wingdings" panose="05000000000000000000" pitchFamily="2" charset="2"/>
-              <a:buChar char="Ø"/>
-            </a:pPr>
-            <a:r>
-              <a:rPr lang="en-US" altLang="zh-TW" sz="2000" dirty="0">
-                <a:latin typeface="+mj-lt"/>
-              </a:rPr>
-              <a:t>HW/SW integration should be stable</a:t>
-            </a:r>
-            <a:endParaRPr lang="en-US" altLang="zh-TW" sz="2000" dirty="0" smtClean="0">
-              <a:latin typeface="+mj-lt"/>
-            </a:endParaRPr>
-          </a:p>
-          <a:p>
-            <a:pPr marL="1085850" lvl="1" indent="-342900">
-              <a:buFont typeface="Wingdings" panose="05000000000000000000" pitchFamily="2" charset="2"/>
-              <a:buChar char="Ø"/>
-            </a:pPr>
-            <a:r>
-              <a:rPr lang="en-US" altLang="zh-TW" sz="2000" dirty="0">
-                <a:latin typeface="+mj-lt"/>
-              </a:rPr>
-              <a:t>EIT (Engineering Integration Testing)</a:t>
-            </a:r>
-            <a:endParaRPr lang="zh-TW" altLang="zh-TW" sz="2000" dirty="0">
-              <a:latin typeface="+mj-lt"/>
-            </a:endParaRPr>
-          </a:p>
-          <a:p>
-            <a:pPr marL="1085850" lvl="1" indent="-342900">
-              <a:buFont typeface="Wingdings" panose="05000000000000000000" pitchFamily="2" charset="2"/>
-              <a:buChar char="Ø"/>
-            </a:pPr>
-            <a:r>
-              <a:rPr lang="en-US" altLang="zh-TW" sz="2000" dirty="0">
-                <a:latin typeface="+mj-lt"/>
-              </a:rPr>
-              <a:t>Software Usability Assessment (conduct with ENG-116)</a:t>
-            </a:r>
-            <a:endParaRPr lang="en-US" altLang="zh-TW" sz="1800" dirty="0" smtClean="0">
-              <a:latin typeface="+mj-lt"/>
-            </a:endParaRPr>
-          </a:p>
-          <a:p>
-            <a:pPr marL="1085850" lvl="1" indent="-342900">
-              <a:buFont typeface="Wingdings" panose="05000000000000000000" pitchFamily="2" charset="2"/>
-              <a:buChar char="Ø"/>
-            </a:pPr>
-            <a:r>
-              <a:rPr lang="en-US" altLang="zh-TW" sz="2000" dirty="0">
-                <a:latin typeface="+mj-lt"/>
-              </a:rPr>
-              <a:t>Technical writing support</a:t>
-            </a:r>
-            <a:endParaRPr lang="zh-TW" altLang="zh-TW" sz="2000" dirty="0">
-              <a:latin typeface="+mj-lt"/>
-            </a:endParaRPr>
-          </a:p>
-          <a:p>
-            <a:pPr marL="1085850" lvl="1" indent="-342900">
-              <a:buFont typeface="Wingdings" panose="05000000000000000000" pitchFamily="2" charset="2"/>
-              <a:buChar char="Ø"/>
-            </a:pPr>
-            <a:r>
-              <a:rPr lang="en-US" altLang="zh-TW" sz="2000" dirty="0">
-                <a:latin typeface="+mj-lt"/>
-              </a:rPr>
-              <a:t>Marketing Support (screen capture, demo mode, …)</a:t>
-            </a:r>
-            <a:endParaRPr lang="zh-TW" altLang="zh-TW" sz="2000" dirty="0">
-              <a:latin typeface="+mj-lt"/>
-            </a:endParaRPr>
-          </a:p>
-          <a:p>
-            <a:pPr marL="1085850" lvl="1" indent="-342900">
-              <a:buFont typeface="Wingdings" panose="05000000000000000000" pitchFamily="2" charset="2"/>
-              <a:buChar char="Ø"/>
-            </a:pPr>
-            <a:r>
-              <a:rPr lang="en-US" altLang="zh-TW" sz="2000" dirty="0">
-                <a:latin typeface="+mj-lt"/>
-              </a:rPr>
-              <a:t>Testing software release</a:t>
-            </a:r>
-            <a:endParaRPr lang="zh-TW" altLang="zh-TW" sz="2000" dirty="0">
-              <a:latin typeface="+mj-lt"/>
-            </a:endParaRPr>
-          </a:p>
-          <a:p>
-            <a:pPr marL="1085850" lvl="1" indent="-342900">
-              <a:buFont typeface="Wingdings" panose="05000000000000000000" pitchFamily="2" charset="2"/>
-              <a:buChar char="Ø"/>
-            </a:pPr>
-            <a:r>
-              <a:rPr lang="en-US" altLang="zh-TW" sz="2000" dirty="0">
-                <a:latin typeface="+mj-lt"/>
-              </a:rPr>
-              <a:t>Factory Prototype design review (conduct with ENG-116</a:t>
-            </a:r>
-            <a:r>
-              <a:rPr lang="en-US" altLang="zh-TW" sz="2000" dirty="0" smtClean="0">
-                <a:latin typeface="+mj-lt"/>
-              </a:rPr>
-              <a:t>)</a:t>
-            </a:r>
-            <a:endParaRPr lang="zh-TW" altLang="zh-TW" dirty="0">
-              <a:latin typeface="+mj-lt"/>
-            </a:endParaRPr>
-          </a:p>
-          <a:p>
-            <a:pPr marL="1485900" lvl="2" indent="-342900">
-              <a:buFont typeface="Wingdings" panose="05000000000000000000" pitchFamily="2" charset="2"/>
-              <a:buChar char="Ø"/>
-            </a:pPr>
-            <a:endParaRPr lang="en-US" altLang="zh-TW" sz="1800" dirty="0">
-              <a:latin typeface="+mj-lt"/>
-            </a:endParaRPr>
-          </a:p>
-        </p:txBody>
-      </p:sp>
-      <p:sp>
-        <p:nvSpPr>
-          <p:cNvPr id="4" name="Title 3"/>
-          <p:cNvSpPr>
-            <a:spLocks noGrp="1"/>
-          </p:cNvSpPr>
-          <p:nvPr>
-            <p:ph type="title"/>
-          </p:nvPr>
-        </p:nvSpPr>
-        <p:spPr>
-          <a:xfrm>
-            <a:off x="228600" y="228600"/>
-            <a:ext cx="7716280" cy="553998"/>
-          </a:xfrm>
-        </p:spPr>
-        <p:txBody>
-          <a:bodyPr/>
-          <a:lstStyle/>
-          <a:p>
-            <a:pPr marL="342900" indent="-342900"/>
-            <a:r>
-              <a:rPr lang="en-US" altLang="zh-TW" dirty="0">
-                <a:solidFill>
-                  <a:schemeClr val="tx1"/>
-                </a:solidFill>
-                <a:latin typeface="+mj-lt"/>
-              </a:rPr>
-              <a:t>ENG-112 </a:t>
-            </a:r>
-            <a:r>
-              <a:rPr lang="en-US" altLang="zh-TW" sz="2800" dirty="0">
-                <a:solidFill>
-                  <a:schemeClr val="tx1"/>
-                </a:solidFill>
-                <a:latin typeface="+mj-lt"/>
-              </a:rPr>
-              <a:t>Consumer Software Design Method</a:t>
-            </a:r>
-          </a:p>
-        </p:txBody>
-      </p:sp>
-    </p:spTree>
-    <p:extLst>
-      <p:ext uri="{BB962C8B-B14F-4D97-AF65-F5344CB8AC3E}">
-        <p14:creationId xmlns:p14="http://schemas.microsoft.com/office/powerpoint/2010/main" xmlns="" val="2123413861"/>
-      </p:ext>
-    </p:extLst>
-  </p:cSld>
-  <p:clrMapOvr>
-    <a:masterClrMapping/>
-  </p:clrMapOvr>
-  <p:timing>
-    <p:tnLst>
-      <p:par>
-        <p:cTn id="1" dur="indefinite" restart="never" nodeType="tmRoot"/>
-      </p:par>
-    </p:tnLst>
-  </p:timing>
-</p:sld>
-</file>
-
-<file path=ppt/slides/slide19.xml><?xml version="1.0" encoding="utf-8"?>
-<p:sld xmlns:a="http://schemas.openxmlformats.org/drawingml/2006/main" xmlns:r="http://schemas.openxmlformats.org/officeDocument/2006/relationships" xmlns:p="http://schemas.openxmlformats.org/presentationml/2006/main">
-  <p:cSld>
-    <p:spTree>
-      <p:nvGrpSpPr>
-        <p:cNvPr id="1" name=""/>
-        <p:cNvGrpSpPr/>
-        <p:nvPr/>
-      </p:nvGrpSpPr>
-      <p:grpSpPr>
-        <a:xfrm>
-          <a:off x="0" y="0"/>
-          <a:ext cx="0" cy="0"/>
-          <a:chOff x="0" y="0"/>
-          <a:chExt cx="0" cy="0"/>
-        </a:xfrm>
-      </p:grpSpPr>
-      <p:sp>
-        <p:nvSpPr>
-          <p:cNvPr id="3" name="Content Placeholder 2"/>
-          <p:cNvSpPr>
-            <a:spLocks noGrp="1"/>
-          </p:cNvSpPr>
-          <p:nvPr>
-            <p:ph idx="1"/>
-          </p:nvPr>
-        </p:nvSpPr>
-        <p:spPr>
-          <a:xfrm>
-            <a:off x="228600" y="986319"/>
-            <a:ext cx="8689622" cy="5355312"/>
-          </a:xfrm>
-        </p:spPr>
-        <p:txBody>
-          <a:bodyPr/>
-          <a:lstStyle/>
-          <a:p>
-            <a:pPr marL="342900" indent="-342900">
-              <a:buFont typeface="Arial" panose="020B0604020202020204" pitchFamily="34" charset="0"/>
-              <a:buChar char="•"/>
-            </a:pPr>
-            <a:r>
-              <a:rPr lang="en-US" altLang="zh-TW" sz="2400" dirty="0">
-                <a:latin typeface="+mj-lt"/>
-              </a:rPr>
-              <a:t>Pilot Run Phase</a:t>
-            </a:r>
-            <a:endParaRPr lang="en-US" altLang="zh-TW" sz="2400" dirty="0" smtClean="0">
-              <a:latin typeface="+mj-lt"/>
-            </a:endParaRPr>
-          </a:p>
-          <a:p>
-            <a:pPr marL="1200150" lvl="1" indent="-457200">
-              <a:buFont typeface="Wingdings" panose="05000000000000000000" pitchFamily="2" charset="2"/>
-              <a:buChar char="Ø"/>
-            </a:pPr>
-            <a:r>
-              <a:rPr lang="en-US" altLang="zh-TW" sz="2000" dirty="0" smtClean="0">
-                <a:solidFill>
-                  <a:srgbClr val="FF0000"/>
-                </a:solidFill>
-                <a:latin typeface="+mj-lt"/>
-              </a:rPr>
-              <a:t>Goal - </a:t>
-            </a:r>
-            <a:r>
-              <a:rPr lang="en-US" altLang="zh-TW" sz="2000" dirty="0">
-                <a:solidFill>
-                  <a:srgbClr val="FF0000"/>
-                </a:solidFill>
-                <a:latin typeface="+mj-lt"/>
-              </a:rPr>
-              <a:t>confirm there are no design faults or factory process </a:t>
-            </a:r>
-            <a:r>
-              <a:rPr lang="en-US" altLang="zh-TW" sz="2000" dirty="0" smtClean="0">
-                <a:solidFill>
-                  <a:srgbClr val="FF0000"/>
-                </a:solidFill>
-                <a:latin typeface="+mj-lt"/>
-              </a:rPr>
-              <a:t>limitations</a:t>
-            </a:r>
-          </a:p>
-          <a:p>
-            <a:pPr marL="1085850" lvl="1" indent="-342900">
-              <a:buFont typeface="Wingdings" panose="05000000000000000000" pitchFamily="2" charset="2"/>
-              <a:buChar char="Ø"/>
-            </a:pPr>
-            <a:r>
-              <a:rPr lang="en-US" altLang="zh-TW" sz="2000" dirty="0">
-                <a:latin typeface="+mj-lt"/>
-              </a:rPr>
-              <a:t>Custom-level testing prior to production release</a:t>
-            </a:r>
-            <a:endParaRPr lang="zh-TW" altLang="zh-TW" sz="2000" dirty="0">
-              <a:latin typeface="+mj-lt"/>
-            </a:endParaRPr>
-          </a:p>
-          <a:p>
-            <a:pPr marL="1085850" lvl="1" indent="-342900">
-              <a:buFont typeface="Wingdings" panose="05000000000000000000" pitchFamily="2" charset="2"/>
-              <a:buChar char="Ø"/>
-            </a:pPr>
-            <a:r>
-              <a:rPr lang="en-US" altLang="zh-TW" sz="2000" dirty="0" smtClean="0">
-                <a:latin typeface="+mj-lt"/>
-              </a:rPr>
-              <a:t>Field testing</a:t>
-            </a:r>
-          </a:p>
-          <a:p>
-            <a:pPr marL="1085850" lvl="1" indent="-342900">
-              <a:buFont typeface="Wingdings" panose="05000000000000000000" pitchFamily="2" charset="2"/>
-              <a:buChar char="Ø"/>
-            </a:pPr>
-            <a:r>
-              <a:rPr lang="en-US" altLang="zh-TW" sz="2000" dirty="0">
-                <a:latin typeface="+mj-lt"/>
-              </a:rPr>
-              <a:t>Problem shall be managed via the Software Change Control Process</a:t>
-            </a:r>
-            <a:endParaRPr lang="zh-TW" altLang="zh-TW" sz="2000" dirty="0">
-              <a:latin typeface="+mj-lt"/>
-            </a:endParaRPr>
-          </a:p>
-          <a:p>
-            <a:pPr marL="1085850" lvl="1" indent="-342900">
-              <a:buFont typeface="Wingdings" panose="05000000000000000000" pitchFamily="2" charset="2"/>
-              <a:buChar char="Ø"/>
-            </a:pPr>
-            <a:r>
-              <a:rPr lang="en-US" altLang="zh-TW" sz="2000" dirty="0">
-                <a:latin typeface="+mj-lt"/>
-              </a:rPr>
-              <a:t>Design changes: Lead Software Engineer </a:t>
-            </a:r>
-            <a:r>
-              <a:rPr lang="en-US" altLang="zh-TW" sz="2000" dirty="0" smtClean="0">
-                <a:latin typeface="+mj-lt"/>
-              </a:rPr>
-              <a:t>consider –</a:t>
-            </a:r>
-          </a:p>
-          <a:p>
-            <a:pPr marL="1485900" lvl="2" indent="-342900">
-              <a:buFont typeface="Wingdings" panose="05000000000000000000" pitchFamily="2" charset="2"/>
-              <a:buChar char="ü"/>
-            </a:pPr>
-            <a:r>
-              <a:rPr lang="en-US" altLang="zh-TW" sz="1800" dirty="0">
-                <a:latin typeface="+mj-lt"/>
-              </a:rPr>
-              <a:t>C</a:t>
-            </a:r>
-            <a:r>
-              <a:rPr lang="en-US" altLang="zh-TW" sz="1800" dirty="0" smtClean="0">
-                <a:latin typeface="+mj-lt"/>
-              </a:rPr>
-              <a:t>ustomers </a:t>
-            </a:r>
-            <a:r>
-              <a:rPr lang="en-US" altLang="zh-TW" sz="1800" dirty="0">
-                <a:latin typeface="+mj-lt"/>
-              </a:rPr>
-              <a:t>returning products</a:t>
-            </a:r>
-            <a:r>
-              <a:rPr lang="en-US" altLang="zh-TW" sz="1800" dirty="0" smtClean="0">
-                <a:latin typeface="+mj-lt"/>
-              </a:rPr>
-              <a:t>?</a:t>
-            </a:r>
-          </a:p>
-          <a:p>
-            <a:pPr marL="1485900" lvl="2" indent="-342900">
-              <a:buFont typeface="Wingdings" panose="05000000000000000000" pitchFamily="2" charset="2"/>
-              <a:buChar char="ü"/>
-            </a:pPr>
-            <a:r>
-              <a:rPr lang="en-US" altLang="zh-TW" sz="1800" dirty="0">
-                <a:latin typeface="+mj-lt"/>
-              </a:rPr>
-              <a:t>C</a:t>
-            </a:r>
-            <a:r>
-              <a:rPr lang="en-US" altLang="zh-TW" sz="1800" dirty="0" smtClean="0">
-                <a:latin typeface="+mj-lt"/>
-              </a:rPr>
-              <a:t>alling </a:t>
-            </a:r>
-            <a:r>
-              <a:rPr lang="en-US" altLang="zh-TW" sz="1800" dirty="0">
-                <a:latin typeface="+mj-lt"/>
-              </a:rPr>
-              <a:t>Customer Support</a:t>
-            </a:r>
-            <a:r>
-              <a:rPr lang="en-US" altLang="zh-TW" sz="1800" dirty="0" smtClean="0">
-                <a:latin typeface="+mj-lt"/>
-              </a:rPr>
-              <a:t>?</a:t>
-            </a:r>
-          </a:p>
-          <a:p>
-            <a:pPr marL="1485900" lvl="2" indent="-342900">
-              <a:buFont typeface="Wingdings" panose="05000000000000000000" pitchFamily="2" charset="2"/>
-              <a:buChar char="ü"/>
-            </a:pPr>
-            <a:r>
-              <a:rPr lang="en-US" altLang="zh-TW" sz="1800" dirty="0">
-                <a:latin typeface="+mj-lt"/>
-              </a:rPr>
-              <a:t>Schedule/cost impact of this change</a:t>
-            </a:r>
-            <a:endParaRPr lang="en-US" altLang="zh-TW" sz="1800" dirty="0" smtClean="0">
-              <a:latin typeface="+mj-lt"/>
-            </a:endParaRPr>
-          </a:p>
-          <a:p>
-            <a:pPr marL="1085850" lvl="1" indent="-342900">
-              <a:buFont typeface="Wingdings" panose="05000000000000000000" pitchFamily="2" charset="2"/>
-              <a:buChar char="Ø"/>
-            </a:pPr>
-            <a:r>
-              <a:rPr lang="en-US" altLang="zh-TW" sz="2000" dirty="0" smtClean="0">
-                <a:solidFill>
-                  <a:srgbClr val="FF0000"/>
-                </a:solidFill>
-                <a:latin typeface="+mj-lt"/>
-              </a:rPr>
-              <a:t>Product </a:t>
-            </a:r>
-            <a:r>
-              <a:rPr lang="en-US" altLang="zh-TW" sz="2000" dirty="0">
-                <a:solidFill>
-                  <a:srgbClr val="FF0000"/>
-                </a:solidFill>
-                <a:latin typeface="+mj-lt"/>
-              </a:rPr>
-              <a:t>Validation</a:t>
-            </a:r>
-            <a:r>
-              <a:rPr lang="en-US" altLang="zh-TW" sz="2000" dirty="0">
-                <a:latin typeface="+mj-lt"/>
-              </a:rPr>
-              <a:t> Review: verifying the product satisfies the top level requirement</a:t>
-            </a:r>
-            <a:endParaRPr lang="zh-TW" altLang="zh-TW" sz="2000" dirty="0">
-              <a:latin typeface="+mj-lt"/>
-            </a:endParaRPr>
-          </a:p>
-          <a:p>
-            <a:pPr marL="1085850" lvl="1" indent="-342900">
-              <a:buFont typeface="Wingdings" panose="05000000000000000000" pitchFamily="2" charset="2"/>
-              <a:buChar char="Ø"/>
-            </a:pPr>
-            <a:endParaRPr lang="zh-TW" altLang="zh-TW" dirty="0" smtClean="0">
-              <a:latin typeface="+mj-lt"/>
-            </a:endParaRPr>
-          </a:p>
-          <a:p>
-            <a:pPr marL="1485900" lvl="2" indent="-342900">
-              <a:buFont typeface="Wingdings" panose="05000000000000000000" pitchFamily="2" charset="2"/>
-              <a:buChar char="Ø"/>
-            </a:pPr>
-            <a:endParaRPr lang="en-US" altLang="zh-TW" sz="1800" dirty="0">
-              <a:latin typeface="+mj-lt"/>
-            </a:endParaRPr>
-          </a:p>
-        </p:txBody>
-      </p:sp>
-      <p:sp>
-        <p:nvSpPr>
-          <p:cNvPr id="4" name="Title 3"/>
-          <p:cNvSpPr>
-            <a:spLocks noGrp="1"/>
-          </p:cNvSpPr>
-          <p:nvPr>
-            <p:ph type="title"/>
-          </p:nvPr>
-        </p:nvSpPr>
-        <p:spPr>
-          <a:xfrm>
-            <a:off x="228600" y="228600"/>
-            <a:ext cx="7716280" cy="553998"/>
-          </a:xfrm>
-        </p:spPr>
-        <p:txBody>
-          <a:bodyPr/>
-          <a:lstStyle/>
-          <a:p>
-            <a:pPr marL="342900" indent="-342900"/>
-            <a:r>
-              <a:rPr lang="en-US" altLang="zh-TW" dirty="0">
-                <a:solidFill>
-                  <a:schemeClr val="tx1"/>
-                </a:solidFill>
-                <a:latin typeface="+mj-lt"/>
-              </a:rPr>
-              <a:t>ENG-112 </a:t>
-            </a:r>
-            <a:r>
-              <a:rPr lang="en-US" altLang="zh-TW" sz="2800" dirty="0">
-                <a:solidFill>
-                  <a:schemeClr val="tx1"/>
-                </a:solidFill>
-                <a:latin typeface="+mj-lt"/>
-              </a:rPr>
-              <a:t>Consumer Software Design Method</a:t>
-            </a:r>
-          </a:p>
-        </p:txBody>
-      </p:sp>
-    </p:spTree>
-    <p:extLst>
-      <p:ext uri="{BB962C8B-B14F-4D97-AF65-F5344CB8AC3E}">
-        <p14:creationId xmlns:p14="http://schemas.microsoft.com/office/powerpoint/2010/main" xmlns="" val="3040030372"/>
-      </p:ext>
-    </p:extLst>
-  </p:cSld>
-  <p:clrMapOvr>
-    <a:masterClrMapping/>
-  </p:clrMapOvr>
-  <p:timing>
-    <p:tnLst>
-      <p:par>
-        <p:cTn id="1" dur="indefinite" restart="never" nodeType="tmRoot"/>
-      </p:par>
-    </p:tnLst>
-  </p:timing>
-</p:sld>
-</file>
-
-<file path=ppt/slides/slide2.xml><?xml version="1.0" encoding="utf-8"?>
-<p:sld xmlns:a="http://schemas.openxmlformats.org/drawingml/2006/main" xmlns:r="http://schemas.openxmlformats.org/officeDocument/2006/relationships" xmlns:p="http://schemas.openxmlformats.org/presentationml/2006/main">
-  <p:cSld>
-    <p:spTree>
-      <p:nvGrpSpPr>
-        <p:cNvPr id="1" name=""/>
-        <p:cNvGrpSpPr/>
-        <p:nvPr/>
-      </p:nvGrpSpPr>
-      <p:grpSpPr>
-        <a:xfrm>
-          <a:off x="0" y="0"/>
-          <a:ext cx="0" cy="0"/>
-          <a:chOff x="0" y="0"/>
-          <a:chExt cx="0" cy="0"/>
-        </a:xfrm>
-      </p:grpSpPr>
-      <p:sp>
-        <p:nvSpPr>
-          <p:cNvPr id="3" name="Content Placeholder 2"/>
-          <p:cNvSpPr>
-            <a:spLocks noGrp="1"/>
-          </p:cNvSpPr>
-          <p:nvPr>
-            <p:ph idx="1"/>
-          </p:nvPr>
-        </p:nvSpPr>
-        <p:spPr>
-          <a:xfrm>
-            <a:off x="228600" y="986319"/>
-            <a:ext cx="8689622" cy="5355312"/>
-          </a:xfrm>
-        </p:spPr>
-        <p:txBody>
-          <a:bodyPr/>
-          <a:lstStyle/>
-          <a:p>
-            <a:pPr marL="342900" indent="-342900">
-              <a:buFont typeface="Arial"/>
-              <a:buChar char="•"/>
-            </a:pPr>
-            <a:r>
-              <a:rPr lang="en-US" sz="2400" dirty="0" smtClean="0">
-                <a:latin typeface="+mj-lt"/>
-              </a:rPr>
-              <a:t>Development evolution</a:t>
-            </a:r>
-          </a:p>
-          <a:p>
-            <a:pPr marL="342900" indent="-342900">
-              <a:buFont typeface="Arial"/>
-              <a:buChar char="•"/>
-            </a:pPr>
-            <a:r>
-              <a:rPr lang="en-US" altLang="zh-TW" sz="2400" dirty="0">
-                <a:latin typeface="+mj-lt"/>
-                <a:sym typeface="Gill Sans Light"/>
-              </a:rPr>
-              <a:t>Software Configuration </a:t>
-            </a:r>
-            <a:r>
-              <a:rPr lang="en-US" altLang="zh-TW" sz="2400" dirty="0" smtClean="0">
-                <a:latin typeface="+mj-lt"/>
-                <a:sym typeface="Gill Sans Light"/>
-              </a:rPr>
-              <a:t>Management</a:t>
-            </a:r>
-            <a:endParaRPr lang="en-US" sz="2400" dirty="0" smtClean="0">
-              <a:latin typeface="+mj-lt"/>
-            </a:endParaRPr>
-          </a:p>
-          <a:p>
-            <a:pPr marL="342900" indent="-342900">
-              <a:buFont typeface="Arial"/>
-              <a:buChar char="•"/>
-            </a:pPr>
-            <a:r>
-              <a:rPr lang="en-US" altLang="zh-TW" sz="2400" dirty="0">
-                <a:latin typeface="+mj-lt"/>
-              </a:rPr>
-              <a:t>Current </a:t>
-            </a:r>
-            <a:r>
-              <a:rPr lang="en-US" altLang="zh-TW" sz="2400" dirty="0" smtClean="0">
-                <a:latin typeface="+mj-lt"/>
-              </a:rPr>
-              <a:t>process</a:t>
-            </a:r>
-            <a:endParaRPr lang="en-US" sz="2400" dirty="0" smtClean="0">
-              <a:latin typeface="+mj-lt"/>
-            </a:endParaRPr>
-          </a:p>
-          <a:p>
-            <a:pPr marL="342900" indent="-342900">
-              <a:buFont typeface="Arial"/>
-              <a:buChar char="•"/>
-            </a:pPr>
-            <a:r>
-              <a:rPr lang="en-US" sz="2400" dirty="0" smtClean="0">
-                <a:latin typeface="+mj-lt"/>
-              </a:rPr>
-              <a:t>V model</a:t>
-            </a:r>
-          </a:p>
-          <a:p>
-            <a:pPr marL="342900" indent="-342900">
-              <a:buFont typeface="Arial"/>
-              <a:buChar char="•"/>
-            </a:pPr>
-            <a:r>
-              <a:rPr lang="en-US" sz="2400" dirty="0" smtClean="0">
-                <a:latin typeface="+mj-lt"/>
-              </a:rPr>
-              <a:t>ENG-100 </a:t>
-            </a:r>
-            <a:r>
-              <a:rPr lang="en-US" altLang="zh-TW" sz="2400" dirty="0" smtClean="0">
-                <a:latin typeface="+mj-lt"/>
-              </a:rPr>
-              <a:t>Consumer </a:t>
-            </a:r>
-            <a:r>
-              <a:rPr lang="en-US" altLang="zh-TW" sz="2400" dirty="0">
-                <a:latin typeface="+mj-lt"/>
-              </a:rPr>
-              <a:t>Product Development and </a:t>
-            </a:r>
-            <a:r>
-              <a:rPr lang="en-US" altLang="zh-TW" sz="2400" dirty="0" smtClean="0">
-                <a:latin typeface="+mj-lt"/>
-              </a:rPr>
-              <a:t>Release</a:t>
-            </a:r>
-          </a:p>
-          <a:p>
-            <a:pPr marL="342900" indent="-342900">
-              <a:buFont typeface="Arial"/>
-              <a:buChar char="•"/>
-            </a:pPr>
-            <a:r>
-              <a:rPr lang="en-US" altLang="zh-TW" sz="2400" dirty="0">
-                <a:latin typeface="+mj-lt"/>
-              </a:rPr>
-              <a:t>ENG-112 Consumer Software Design </a:t>
-            </a:r>
-            <a:r>
-              <a:rPr lang="en-US" altLang="zh-TW" sz="2400" dirty="0" smtClean="0">
-                <a:latin typeface="+mj-lt"/>
-              </a:rPr>
-              <a:t>Method</a:t>
-            </a:r>
-          </a:p>
-          <a:p>
-            <a:pPr marL="342900" indent="-342900">
-              <a:buFont typeface="Arial"/>
-              <a:buChar char="•"/>
-            </a:pPr>
-            <a:r>
-              <a:rPr lang="en-US" altLang="zh-TW" sz="2400" dirty="0">
-                <a:latin typeface="+mj-lt"/>
-              </a:rPr>
-              <a:t>ENG-116 Consumer Engineering Design Review </a:t>
-            </a:r>
-            <a:r>
-              <a:rPr lang="en-US" altLang="zh-TW" sz="2400" dirty="0" smtClean="0">
-                <a:latin typeface="+mj-lt"/>
-              </a:rPr>
-              <a:t>Procedure</a:t>
-            </a:r>
-          </a:p>
-          <a:p>
-            <a:pPr marL="342900" indent="-342900">
-              <a:buFont typeface="Arial"/>
-              <a:buChar char="•"/>
-            </a:pPr>
-            <a:r>
-              <a:rPr lang="en-US" altLang="zh-TW" sz="2400" dirty="0"/>
-              <a:t>Garmin product development </a:t>
-            </a:r>
-            <a:r>
-              <a:rPr lang="en-US" altLang="zh-TW" sz="2400" dirty="0" smtClean="0"/>
-              <a:t>process</a:t>
-            </a:r>
-          </a:p>
-          <a:p>
-            <a:pPr marL="342900" indent="-342900">
-              <a:buFont typeface="Arial"/>
-              <a:buChar char="•"/>
-            </a:pPr>
-            <a:r>
-              <a:rPr lang="en-US" altLang="zh-TW" sz="2400" dirty="0">
-                <a:latin typeface="+mj-lt"/>
-              </a:rPr>
-              <a:t>APAC derivative product develop flow overview</a:t>
-            </a:r>
-            <a:endParaRPr lang="zh-TW" altLang="zh-TW" sz="2400" dirty="0">
-              <a:latin typeface="+mj-lt"/>
-            </a:endParaRPr>
-          </a:p>
-          <a:p>
-            <a:pPr marL="342900" indent="-342900">
-              <a:buFont typeface="Arial"/>
-              <a:buChar char="•"/>
-            </a:pPr>
-            <a:endParaRPr lang="en-US" altLang="zh-TW" sz="2400" dirty="0">
-              <a:latin typeface="+mj-lt"/>
-            </a:endParaRPr>
-          </a:p>
-          <a:p>
-            <a:pPr marL="342900" indent="-342900">
-              <a:buFont typeface="Arial"/>
-              <a:buChar char="•"/>
-            </a:pPr>
-            <a:endParaRPr lang="en-US" sz="2400" dirty="0" smtClean="0">
-              <a:latin typeface="+mj-lt"/>
-            </a:endParaRPr>
-          </a:p>
-          <a:p>
-            <a:pPr marL="1085850" lvl="1" indent="-342900">
-              <a:buFont typeface="Arial"/>
-              <a:buChar char="•"/>
-            </a:pPr>
-            <a:endParaRPr lang="en-US" sz="3000" dirty="0">
-              <a:latin typeface="+mj-lt"/>
-            </a:endParaRPr>
-          </a:p>
-        </p:txBody>
-      </p:sp>
-      <p:sp>
-        <p:nvSpPr>
-          <p:cNvPr id="4" name="Title 3"/>
-          <p:cNvSpPr>
-            <a:spLocks noGrp="1"/>
-          </p:cNvSpPr>
-          <p:nvPr>
-            <p:ph type="title"/>
-          </p:nvPr>
-        </p:nvSpPr>
-        <p:spPr>
-          <a:xfrm>
-            <a:off x="228600" y="228600"/>
-            <a:ext cx="1590179" cy="553998"/>
-          </a:xfrm>
-        </p:spPr>
-        <p:txBody>
-          <a:bodyPr/>
-          <a:lstStyle/>
-          <a:p>
-            <a:r>
-              <a:rPr lang="en-US" b="0" dirty="0" smtClean="0">
-                <a:solidFill>
-                  <a:schemeClr val="tx1"/>
-                </a:solidFill>
-                <a:latin typeface="+mj-lt"/>
-              </a:rPr>
-              <a:t>Agenda</a:t>
-            </a:r>
-            <a:endParaRPr lang="en-US" b="0" dirty="0">
-              <a:solidFill>
-                <a:schemeClr val="tx1"/>
-              </a:solidFill>
-              <a:latin typeface="+mj-lt"/>
-            </a:endParaRPr>
-          </a:p>
-        </p:txBody>
-      </p:sp>
-      <p:sp>
-        <p:nvSpPr>
-          <p:cNvPr id="2" name="Slide Number Placeholder 1"/>
-          <p:cNvSpPr>
-            <a:spLocks noGrp="1"/>
-          </p:cNvSpPr>
-          <p:nvPr>
-            <p:ph type="sldNum" sz="quarter" idx="10"/>
-          </p:nvPr>
-        </p:nvSpPr>
-        <p:spPr/>
-        <p:txBody>
-          <a:bodyPr/>
-          <a:lstStyle/>
-          <a:p>
-            <a:fld id="{F52E3F39-0206-E343-A815-B0E9B8087364}" type="slidenum">
-              <a:rPr lang="en-US" smtClean="0">
-                <a:latin typeface="+mj-lt"/>
-              </a:rPr>
-              <a:pPr/>
-              <a:t>2</a:t>
-            </a:fld>
-            <a:endParaRPr lang="en-US" dirty="0">
-              <a:latin typeface="+mj-lt"/>
-            </a:endParaRPr>
-          </a:p>
-        </p:txBody>
-      </p:sp>
-    </p:spTree>
-    <p:extLst>
-      <p:ext uri="{BB962C8B-B14F-4D97-AF65-F5344CB8AC3E}">
-        <p14:creationId xmlns:p14="http://schemas.microsoft.com/office/powerpoint/2010/main" xmlns="" val="2707758325"/>
-      </p:ext>
-    </p:extLst>
-  </p:cSld>
-  <p:clrMapOvr>
-    <a:masterClrMapping/>
-  </p:clrMapOvr>
-  <p:timing>
-    <p:tnLst>
-      <p:par>
-        <p:cTn id="1" dur="indefinite" restart="never" nodeType="tmRoot"/>
-      </p:par>
-    </p:tnLst>
-  </p:timing>
-</p:sld>
-</file>
-
-<file path=ppt/slides/slide20.xml><?xml version="1.0" encoding="utf-8"?>
-<p:sld xmlns:a="http://schemas.openxmlformats.org/drawingml/2006/main" xmlns:r="http://schemas.openxmlformats.org/officeDocument/2006/relationships" xmlns:p="http://schemas.openxmlformats.org/presentationml/2006/main">
-  <p:cSld>
-    <p:spTree>
-      <p:nvGrpSpPr>
-        <p:cNvPr id="1" name=""/>
-        <p:cNvGrpSpPr/>
-        <p:nvPr/>
-      </p:nvGrpSpPr>
-      <p:grpSpPr>
-        <a:xfrm>
-          <a:off x="0" y="0"/>
-          <a:ext cx="0" cy="0"/>
-          <a:chOff x="0" y="0"/>
-          <a:chExt cx="0" cy="0"/>
-        </a:xfrm>
-      </p:grpSpPr>
-      <p:sp>
-        <p:nvSpPr>
-          <p:cNvPr id="3" name="Content Placeholder 2"/>
-          <p:cNvSpPr>
-            <a:spLocks noGrp="1"/>
-          </p:cNvSpPr>
-          <p:nvPr>
-            <p:ph idx="1"/>
-          </p:nvPr>
-        </p:nvSpPr>
-        <p:spPr>
-          <a:xfrm>
-            <a:off x="228600" y="986319"/>
             <a:ext cx="8689622" cy="4210383"/>
           </a:xfrm>
         </p:spPr>
@@ -7208,7 +6265,7 @@
             <a:fld id="{F52E3F39-0206-E343-A815-B0E9B8087364}" type="slidenum">
               <a:rPr lang="en-US" smtClean="0"/>
               <a:pPr/>
-              <a:t>20</a:t>
+              <a:t>18</a:t>
             </a:fld>
             <a:endParaRPr lang="en-US" dirty="0"/>
           </a:p>
@@ -7313,7 +6370,841 @@
     </p:spTree>
     <p:extLst>
       <p:ext uri="{BB962C8B-B14F-4D97-AF65-F5344CB8AC3E}">
-        <p14:creationId xmlns:p14="http://schemas.microsoft.com/office/powerpoint/2010/main" xmlns="" val="4019875659"/>
+        <p14:creationId xmlns="" xmlns:p14="http://schemas.microsoft.com/office/powerpoint/2010/main" val="4019875659"/>
+      </p:ext>
+    </p:extLst>
+  </p:cSld>
+  <p:clrMapOvr>
+    <a:masterClrMapping/>
+  </p:clrMapOvr>
+  <p:timing>
+    <p:tnLst>
+      <p:par>
+        <p:cTn id="1" dur="indefinite" restart="never" nodeType="tmRoot"/>
+      </p:par>
+    </p:tnLst>
+  </p:timing>
+</p:sld>
+</file>
+
+<file path=ppt/slides/slide19.xml><?xml version="1.0" encoding="utf-8"?>
+<p:sld xmlns:a="http://schemas.openxmlformats.org/drawingml/2006/main" xmlns:r="http://schemas.openxmlformats.org/officeDocument/2006/relationships" xmlns:p="http://schemas.openxmlformats.org/presentationml/2006/main">
+  <p:cSld>
+    <p:spTree>
+      <p:nvGrpSpPr>
+        <p:cNvPr id="1" name=""/>
+        <p:cNvGrpSpPr/>
+        <p:nvPr/>
+      </p:nvGrpSpPr>
+      <p:grpSpPr>
+        <a:xfrm>
+          <a:off x="0" y="0"/>
+          <a:ext cx="0" cy="0"/>
+          <a:chOff x="0" y="0"/>
+          <a:chExt cx="0" cy="0"/>
+        </a:xfrm>
+      </p:grpSpPr>
+      <p:sp>
+        <p:nvSpPr>
+          <p:cNvPr id="4" name="Title 3"/>
+          <p:cNvSpPr>
+            <a:spLocks noGrp="1"/>
+          </p:cNvSpPr>
+          <p:nvPr>
+            <p:ph type="title"/>
+          </p:nvPr>
+        </p:nvSpPr>
+        <p:spPr>
+          <a:xfrm>
+            <a:off x="228600" y="228600"/>
+            <a:ext cx="2634311" cy="492443"/>
+          </a:xfrm>
+        </p:spPr>
+        <p:txBody>
+          <a:bodyPr/>
+          <a:lstStyle/>
+          <a:p>
+            <a:pPr marL="342900" indent="-342900"/>
+            <a:r>
+              <a:rPr lang="en-US" altLang="zh-TW" sz="3200" dirty="0" smtClean="0">
+                <a:solidFill>
+                  <a:schemeClr val="tx1"/>
+                </a:solidFill>
+                <a:latin typeface="+mj-lt"/>
+              </a:rPr>
+              <a:t>Weight of data</a:t>
+            </a:r>
+            <a:endParaRPr lang="en-US" altLang="zh-TW" sz="3200" dirty="0">
+              <a:solidFill>
+                <a:schemeClr val="tx1"/>
+              </a:solidFill>
+              <a:latin typeface="+mj-lt"/>
+            </a:endParaRPr>
+          </a:p>
+        </p:txBody>
+      </p:sp>
+      <p:pic>
+        <p:nvPicPr>
+          <p:cNvPr id="39939" name="Picture 3" descr="C:\Users\LiangLeon\Pictures\GARMIN\weight_of_data.png"/>
+          <p:cNvPicPr>
+            <a:picLocks noChangeAspect="1" noChangeArrowheads="1"/>
+          </p:cNvPicPr>
+          <p:nvPr/>
+        </p:nvPicPr>
+        <p:blipFill>
+          <a:blip r:embed="rId2"/>
+          <a:srcRect/>
+          <a:stretch>
+            <a:fillRect/>
+          </a:stretch>
+        </p:blipFill>
+        <p:spPr bwMode="auto">
+          <a:xfrm>
+            <a:off x="1268268" y="1190809"/>
+            <a:ext cx="6114665" cy="4833100"/>
+          </a:xfrm>
+          <a:prstGeom prst="rect">
+            <a:avLst/>
+          </a:prstGeom>
+          <a:noFill/>
+        </p:spPr>
+      </p:pic>
+    </p:spTree>
+    <p:extLst>
+      <p:ext uri="{BB962C8B-B14F-4D97-AF65-F5344CB8AC3E}">
+        <p14:creationId xmlns="" xmlns:p14="http://schemas.microsoft.com/office/powerpoint/2010/main" val="2123413861"/>
+      </p:ext>
+    </p:extLst>
+  </p:cSld>
+  <p:clrMapOvr>
+    <a:masterClrMapping/>
+  </p:clrMapOvr>
+  <p:timing>
+    <p:tnLst>
+      <p:par>
+        <p:cTn id="1" dur="indefinite" restart="never" nodeType="tmRoot"/>
+      </p:par>
+    </p:tnLst>
+  </p:timing>
+</p:sld>
+</file>
+
+<file path=ppt/slides/slide2.xml><?xml version="1.0" encoding="utf-8"?>
+<p:sld xmlns:a="http://schemas.openxmlformats.org/drawingml/2006/main" xmlns:r="http://schemas.openxmlformats.org/officeDocument/2006/relationships" xmlns:p="http://schemas.openxmlformats.org/presentationml/2006/main">
+  <p:cSld>
+    <p:spTree>
+      <p:nvGrpSpPr>
+        <p:cNvPr id="1" name=""/>
+        <p:cNvGrpSpPr/>
+        <p:nvPr/>
+      </p:nvGrpSpPr>
+      <p:grpSpPr>
+        <a:xfrm>
+          <a:off x="0" y="0"/>
+          <a:ext cx="0" cy="0"/>
+          <a:chOff x="0" y="0"/>
+          <a:chExt cx="0" cy="0"/>
+        </a:xfrm>
+      </p:grpSpPr>
+      <p:sp>
+        <p:nvSpPr>
+          <p:cNvPr id="3" name="Content Placeholder 2"/>
+          <p:cNvSpPr>
+            <a:spLocks noGrp="1"/>
+          </p:cNvSpPr>
+          <p:nvPr>
+            <p:ph idx="1"/>
+          </p:nvPr>
+        </p:nvSpPr>
+        <p:spPr>
+          <a:xfrm>
+            <a:off x="228600" y="986319"/>
+            <a:ext cx="8689622" cy="5355312"/>
+          </a:xfrm>
+        </p:spPr>
+        <p:txBody>
+          <a:bodyPr/>
+          <a:lstStyle/>
+          <a:p>
+            <a:pPr marL="342900" indent="-342900">
+              <a:buFont typeface="Arial"/>
+              <a:buChar char="•"/>
+            </a:pPr>
+            <a:r>
+              <a:rPr lang="en-US" sz="2400" dirty="0" smtClean="0">
+                <a:latin typeface="+mj-lt"/>
+              </a:rPr>
+              <a:t>Development evolution</a:t>
+            </a:r>
+          </a:p>
+          <a:p>
+            <a:pPr marL="342900" indent="-342900">
+              <a:buFont typeface="Arial"/>
+              <a:buChar char="•"/>
+            </a:pPr>
+            <a:r>
+              <a:rPr lang="en-US" altLang="zh-TW" sz="2400" dirty="0">
+                <a:latin typeface="+mj-lt"/>
+                <a:sym typeface="Gill Sans Light"/>
+              </a:rPr>
+              <a:t>Software Configuration </a:t>
+            </a:r>
+            <a:r>
+              <a:rPr lang="en-US" altLang="zh-TW" sz="2400" dirty="0" smtClean="0">
+                <a:latin typeface="+mj-lt"/>
+                <a:sym typeface="Gill Sans Light"/>
+              </a:rPr>
+              <a:t>Management</a:t>
+            </a:r>
+            <a:endParaRPr lang="en-US" sz="2400" dirty="0" smtClean="0">
+              <a:latin typeface="+mj-lt"/>
+            </a:endParaRPr>
+          </a:p>
+          <a:p>
+            <a:pPr marL="342900" indent="-342900">
+              <a:buFont typeface="Arial"/>
+              <a:buChar char="•"/>
+            </a:pPr>
+            <a:r>
+              <a:rPr lang="en-US" altLang="zh-TW" sz="2400" dirty="0">
+                <a:latin typeface="+mj-lt"/>
+              </a:rPr>
+              <a:t>Current </a:t>
+            </a:r>
+            <a:r>
+              <a:rPr lang="en-US" altLang="zh-TW" sz="2400" dirty="0" smtClean="0">
+                <a:latin typeface="+mj-lt"/>
+              </a:rPr>
+              <a:t>process</a:t>
+            </a:r>
+            <a:endParaRPr lang="en-US" sz="2400" dirty="0" smtClean="0">
+              <a:latin typeface="+mj-lt"/>
+            </a:endParaRPr>
+          </a:p>
+          <a:p>
+            <a:pPr marL="342900" indent="-342900">
+              <a:buFont typeface="Arial"/>
+              <a:buChar char="•"/>
+            </a:pPr>
+            <a:r>
+              <a:rPr lang="en-US" sz="2400" dirty="0" smtClean="0">
+                <a:latin typeface="+mj-lt"/>
+              </a:rPr>
+              <a:t>V model</a:t>
+            </a:r>
+          </a:p>
+          <a:p>
+            <a:pPr marL="342900" indent="-342900">
+              <a:buFont typeface="Arial"/>
+              <a:buChar char="•"/>
+            </a:pPr>
+            <a:r>
+              <a:rPr lang="en-US" sz="2400" dirty="0" smtClean="0">
+                <a:latin typeface="+mj-lt"/>
+              </a:rPr>
+              <a:t>ENG-100 </a:t>
+            </a:r>
+            <a:r>
+              <a:rPr lang="en-US" altLang="zh-TW" sz="2400" dirty="0" smtClean="0">
+                <a:latin typeface="+mj-lt"/>
+              </a:rPr>
+              <a:t>Consumer </a:t>
+            </a:r>
+            <a:r>
+              <a:rPr lang="en-US" altLang="zh-TW" sz="2400" dirty="0">
+                <a:latin typeface="+mj-lt"/>
+              </a:rPr>
+              <a:t>Product Development and </a:t>
+            </a:r>
+            <a:r>
+              <a:rPr lang="en-US" altLang="zh-TW" sz="2400" dirty="0" smtClean="0">
+                <a:latin typeface="+mj-lt"/>
+              </a:rPr>
+              <a:t>Release</a:t>
+            </a:r>
+          </a:p>
+          <a:p>
+            <a:pPr marL="342900" indent="-342900">
+              <a:buFont typeface="Arial"/>
+              <a:buChar char="•"/>
+            </a:pPr>
+            <a:r>
+              <a:rPr lang="en-US" altLang="zh-TW" sz="2400" dirty="0">
+                <a:latin typeface="+mj-lt"/>
+              </a:rPr>
+              <a:t>ENG-112 Consumer Software Design </a:t>
+            </a:r>
+            <a:r>
+              <a:rPr lang="en-US" altLang="zh-TW" sz="2400" dirty="0" smtClean="0">
+                <a:latin typeface="+mj-lt"/>
+              </a:rPr>
+              <a:t>Method</a:t>
+            </a:r>
+          </a:p>
+          <a:p>
+            <a:pPr marL="342900" indent="-342900">
+              <a:buFont typeface="Arial"/>
+              <a:buChar char="•"/>
+            </a:pPr>
+            <a:r>
+              <a:rPr lang="en-US" altLang="zh-TW" sz="2400" dirty="0">
+                <a:latin typeface="+mj-lt"/>
+              </a:rPr>
+              <a:t>ENG-116 Consumer Engineering Design Review </a:t>
+            </a:r>
+            <a:r>
+              <a:rPr lang="en-US" altLang="zh-TW" sz="2400" dirty="0" smtClean="0">
+                <a:latin typeface="+mj-lt"/>
+              </a:rPr>
+              <a:t>Procedure</a:t>
+            </a:r>
+          </a:p>
+          <a:p>
+            <a:pPr marL="342900" indent="-342900">
+              <a:buFont typeface="Arial"/>
+              <a:buChar char="•"/>
+            </a:pPr>
+            <a:r>
+              <a:rPr lang="en-US" altLang="zh-TW" sz="2400" dirty="0"/>
+              <a:t>Garmin product development </a:t>
+            </a:r>
+            <a:r>
+              <a:rPr lang="en-US" altLang="zh-TW" sz="2400" dirty="0" smtClean="0"/>
+              <a:t>process</a:t>
+            </a:r>
+          </a:p>
+          <a:p>
+            <a:pPr marL="342900" indent="-342900">
+              <a:buFont typeface="Arial"/>
+              <a:buChar char="•"/>
+            </a:pPr>
+            <a:r>
+              <a:rPr lang="en-US" altLang="zh-TW" sz="2400" dirty="0">
+                <a:latin typeface="+mj-lt"/>
+              </a:rPr>
+              <a:t>APAC derivative product develop flow overview</a:t>
+            </a:r>
+            <a:endParaRPr lang="zh-TW" altLang="zh-TW" sz="2400" dirty="0">
+              <a:latin typeface="+mj-lt"/>
+            </a:endParaRPr>
+          </a:p>
+          <a:p>
+            <a:pPr marL="342900" indent="-342900">
+              <a:buFont typeface="Arial"/>
+              <a:buChar char="•"/>
+            </a:pPr>
+            <a:endParaRPr lang="en-US" altLang="zh-TW" sz="2400" dirty="0">
+              <a:latin typeface="+mj-lt"/>
+            </a:endParaRPr>
+          </a:p>
+          <a:p>
+            <a:pPr marL="342900" indent="-342900">
+              <a:buFont typeface="Arial"/>
+              <a:buChar char="•"/>
+            </a:pPr>
+            <a:endParaRPr lang="en-US" sz="2400" dirty="0" smtClean="0">
+              <a:latin typeface="+mj-lt"/>
+            </a:endParaRPr>
+          </a:p>
+          <a:p>
+            <a:pPr marL="1085850" lvl="1" indent="-342900">
+              <a:buFont typeface="Arial"/>
+              <a:buChar char="•"/>
+            </a:pPr>
+            <a:endParaRPr lang="en-US" sz="3000" dirty="0">
+              <a:latin typeface="+mj-lt"/>
+            </a:endParaRPr>
+          </a:p>
+        </p:txBody>
+      </p:sp>
+      <p:sp>
+        <p:nvSpPr>
+          <p:cNvPr id="4" name="Title 3"/>
+          <p:cNvSpPr>
+            <a:spLocks noGrp="1"/>
+          </p:cNvSpPr>
+          <p:nvPr>
+            <p:ph type="title"/>
+          </p:nvPr>
+        </p:nvSpPr>
+        <p:spPr>
+          <a:xfrm>
+            <a:off x="228600" y="228600"/>
+            <a:ext cx="1590179" cy="553998"/>
+          </a:xfrm>
+        </p:spPr>
+        <p:txBody>
+          <a:bodyPr/>
+          <a:lstStyle/>
+          <a:p>
+            <a:r>
+              <a:rPr lang="en-US" b="0" dirty="0" smtClean="0">
+                <a:solidFill>
+                  <a:schemeClr val="tx1"/>
+                </a:solidFill>
+                <a:latin typeface="+mj-lt"/>
+              </a:rPr>
+              <a:t>Agenda</a:t>
+            </a:r>
+            <a:endParaRPr lang="en-US" b="0" dirty="0">
+              <a:solidFill>
+                <a:schemeClr val="tx1"/>
+              </a:solidFill>
+              <a:latin typeface="+mj-lt"/>
+            </a:endParaRPr>
+          </a:p>
+        </p:txBody>
+      </p:sp>
+      <p:sp>
+        <p:nvSpPr>
+          <p:cNvPr id="2" name="Slide Number Placeholder 1"/>
+          <p:cNvSpPr>
+            <a:spLocks noGrp="1"/>
+          </p:cNvSpPr>
+          <p:nvPr>
+            <p:ph type="sldNum" sz="quarter" idx="10"/>
+          </p:nvPr>
+        </p:nvSpPr>
+        <p:spPr/>
+        <p:txBody>
+          <a:bodyPr/>
+          <a:lstStyle/>
+          <a:p>
+            <a:fld id="{F52E3F39-0206-E343-A815-B0E9B8087364}" type="slidenum">
+              <a:rPr lang="en-US" smtClean="0">
+                <a:latin typeface="+mj-lt"/>
+              </a:rPr>
+              <a:pPr/>
+              <a:t>2</a:t>
+            </a:fld>
+            <a:endParaRPr lang="en-US" dirty="0">
+              <a:latin typeface="+mj-lt"/>
+            </a:endParaRPr>
+          </a:p>
+        </p:txBody>
+      </p:sp>
+    </p:spTree>
+    <p:extLst>
+      <p:ext uri="{BB962C8B-B14F-4D97-AF65-F5344CB8AC3E}">
+        <p14:creationId xmlns="" xmlns:p14="http://schemas.microsoft.com/office/powerpoint/2010/main" val="2707758325"/>
+      </p:ext>
+    </p:extLst>
+  </p:cSld>
+  <p:clrMapOvr>
+    <a:masterClrMapping/>
+  </p:clrMapOvr>
+  <p:timing>
+    <p:tnLst>
+      <p:par>
+        <p:cTn id="1" dur="indefinite" restart="never" nodeType="tmRoot"/>
+      </p:par>
+    </p:tnLst>
+  </p:timing>
+</p:sld>
+</file>
+
+<file path=ppt/slides/slide20.xml><?xml version="1.0" encoding="utf-8"?>
+<p:sld xmlns:a="http://schemas.openxmlformats.org/drawingml/2006/main" xmlns:r="http://schemas.openxmlformats.org/officeDocument/2006/relationships" xmlns:p="http://schemas.openxmlformats.org/presentationml/2006/main">
+  <p:cSld>
+    <p:spTree>
+      <p:nvGrpSpPr>
+        <p:cNvPr id="1" name=""/>
+        <p:cNvGrpSpPr/>
+        <p:nvPr/>
+      </p:nvGrpSpPr>
+      <p:grpSpPr>
+        <a:xfrm>
+          <a:off x="0" y="0"/>
+          <a:ext cx="0" cy="0"/>
+          <a:chOff x="0" y="0"/>
+          <a:chExt cx="0" cy="0"/>
+        </a:xfrm>
+      </p:grpSpPr>
+      <p:sp>
+        <p:nvSpPr>
+          <p:cNvPr id="3" name="Content Placeholder 2"/>
+          <p:cNvSpPr>
+            <a:spLocks noGrp="1"/>
+          </p:cNvSpPr>
+          <p:nvPr>
+            <p:ph idx="1"/>
+          </p:nvPr>
+        </p:nvSpPr>
+        <p:spPr>
+          <a:xfrm>
+            <a:off x="228600" y="986319"/>
+            <a:ext cx="8689622" cy="369332"/>
+          </a:xfrm>
+        </p:spPr>
+        <p:txBody>
+          <a:bodyPr/>
+          <a:lstStyle/>
+          <a:p>
+            <a:pPr marL="1200150" lvl="1" indent="-457200">
+              <a:buFont typeface="Wingdings" pitchFamily="2" charset="2"/>
+              <a:buChar char="l"/>
+            </a:pPr>
+            <a:r>
+              <a:rPr lang="en-US" altLang="zh-TW" sz="2400" dirty="0" smtClean="0">
+                <a:latin typeface="Arial"/>
+              </a:rPr>
+              <a:t>Find the weak classifier with minimum error</a:t>
+            </a:r>
+          </a:p>
+        </p:txBody>
+      </p:sp>
+      <p:sp>
+        <p:nvSpPr>
+          <p:cNvPr id="4" name="Title 3"/>
+          <p:cNvSpPr>
+            <a:spLocks noGrp="1"/>
+          </p:cNvSpPr>
+          <p:nvPr>
+            <p:ph type="title"/>
+          </p:nvPr>
+        </p:nvSpPr>
+        <p:spPr>
+          <a:xfrm>
+            <a:off x="228600" y="228600"/>
+            <a:ext cx="4137928" cy="492443"/>
+          </a:xfrm>
+        </p:spPr>
+        <p:txBody>
+          <a:bodyPr/>
+          <a:lstStyle/>
+          <a:p>
+            <a:pPr marL="342900" indent="-342900"/>
+            <a:r>
+              <a:rPr lang="en-US" altLang="zh-TW" sz="3200" dirty="0" smtClean="0">
+                <a:solidFill>
+                  <a:schemeClr val="tx1"/>
+                </a:solidFill>
+                <a:latin typeface="+mj-lt"/>
+              </a:rPr>
+              <a:t>Weak classifier learner</a:t>
+            </a:r>
+            <a:endParaRPr lang="en-US" altLang="zh-TW" sz="3200" dirty="0">
+              <a:solidFill>
+                <a:schemeClr val="tx1"/>
+              </a:solidFill>
+              <a:latin typeface="+mj-lt"/>
+            </a:endParaRPr>
+          </a:p>
+        </p:txBody>
+      </p:sp>
+      <p:sp>
+        <p:nvSpPr>
+          <p:cNvPr id="21" name="圓角矩形 20"/>
+          <p:cNvSpPr/>
+          <p:nvPr/>
+        </p:nvSpPr>
+        <p:spPr>
+          <a:xfrm>
+            <a:off x="569227" y="2099733"/>
+            <a:ext cx="1674439" cy="1159934"/>
+          </a:xfrm>
+          <a:prstGeom prst="roundRect">
+            <a:avLst/>
+          </a:prstGeom>
+          <a:noFill/>
+          <a:ln w="12700" cmpd="sng"/>
+          <a:effectLst/>
+        </p:spPr>
+        <p:style>
+          <a:lnRef idx="1">
+            <a:schemeClr val="accent1"/>
+          </a:lnRef>
+          <a:fillRef idx="3">
+            <a:schemeClr val="accent1"/>
+          </a:fillRef>
+          <a:effectRef idx="2">
+            <a:schemeClr val="accent1"/>
+          </a:effectRef>
+          <a:fontRef idx="minor">
+            <a:schemeClr val="lt1"/>
+          </a:fontRef>
+        </p:style>
+        <p:txBody>
+          <a:bodyPr rtlCol="0" anchor="ctr"/>
+          <a:lstStyle/>
+          <a:p>
+            <a:pPr algn="ctr"/>
+            <a:r>
+              <a:rPr lang="en-US" altLang="zh-TW" dirty="0" smtClean="0">
+                <a:solidFill>
+                  <a:schemeClr val="tx1"/>
+                </a:solidFill>
+              </a:rPr>
+              <a:t>Data</a:t>
+            </a:r>
+            <a:endParaRPr lang="zh-TW" altLang="en-US" dirty="0">
+              <a:solidFill>
+                <a:schemeClr val="tx1"/>
+              </a:solidFill>
+            </a:endParaRPr>
+          </a:p>
+        </p:txBody>
+      </p:sp>
+      <p:sp>
+        <p:nvSpPr>
+          <p:cNvPr id="22" name="矩形 21"/>
+          <p:cNvSpPr/>
+          <p:nvPr/>
+        </p:nvSpPr>
+        <p:spPr>
+          <a:xfrm>
+            <a:off x="3316661" y="2235205"/>
+            <a:ext cx="2099734" cy="931332"/>
+          </a:xfrm>
+          <a:prstGeom prst="rect">
+            <a:avLst/>
+          </a:prstGeom>
+          <a:noFill/>
+          <a:ln w="12700"/>
+          <a:effectLst/>
+        </p:spPr>
+        <p:style>
+          <a:lnRef idx="1">
+            <a:schemeClr val="accent1"/>
+          </a:lnRef>
+          <a:fillRef idx="3">
+            <a:schemeClr val="accent1"/>
+          </a:fillRef>
+          <a:effectRef idx="2">
+            <a:schemeClr val="accent1"/>
+          </a:effectRef>
+          <a:fontRef idx="minor">
+            <a:schemeClr val="lt1"/>
+          </a:fontRef>
+        </p:style>
+        <p:txBody>
+          <a:bodyPr rtlCol="0" anchor="ctr"/>
+          <a:lstStyle/>
+          <a:p>
+            <a:pPr algn="ctr"/>
+            <a:r>
+              <a:rPr lang="en-US" altLang="zh-TW" dirty="0" smtClean="0">
+                <a:solidFill>
+                  <a:schemeClr val="tx1"/>
+                </a:solidFill>
+              </a:rPr>
+              <a:t>Weak classifier learner</a:t>
+            </a:r>
+            <a:endParaRPr lang="zh-TW" altLang="en-US" dirty="0">
+              <a:solidFill>
+                <a:schemeClr val="tx1"/>
+              </a:solidFill>
+            </a:endParaRPr>
+          </a:p>
+        </p:txBody>
+      </p:sp>
+      <p:sp>
+        <p:nvSpPr>
+          <p:cNvPr id="23" name="向右箭號 22"/>
+          <p:cNvSpPr/>
+          <p:nvPr/>
+        </p:nvSpPr>
+        <p:spPr>
+          <a:xfrm>
+            <a:off x="2429938" y="2599267"/>
+            <a:ext cx="491067" cy="262466"/>
+          </a:xfrm>
+          <a:prstGeom prst="rightArrow">
+            <a:avLst/>
+          </a:prstGeom>
+          <a:solidFill>
+            <a:srgbClr val="002060"/>
+          </a:solidFill>
+        </p:spPr>
+        <p:style>
+          <a:lnRef idx="1">
+            <a:schemeClr val="accent1"/>
+          </a:lnRef>
+          <a:fillRef idx="3">
+            <a:schemeClr val="accent1"/>
+          </a:fillRef>
+          <a:effectRef idx="2">
+            <a:schemeClr val="accent1"/>
+          </a:effectRef>
+          <a:fontRef idx="minor">
+            <a:schemeClr val="lt1"/>
+          </a:fontRef>
+        </p:style>
+        <p:txBody>
+          <a:bodyPr rtlCol="0" anchor="ctr"/>
+          <a:lstStyle/>
+          <a:p>
+            <a:pPr algn="ctr"/>
+            <a:endParaRPr lang="zh-TW" altLang="en-US"/>
+          </a:p>
+        </p:txBody>
+      </p:sp>
+      <p:sp>
+        <p:nvSpPr>
+          <p:cNvPr id="24" name="向右箭號 23"/>
+          <p:cNvSpPr/>
+          <p:nvPr/>
+        </p:nvSpPr>
+        <p:spPr>
+          <a:xfrm>
+            <a:off x="5638805" y="2599267"/>
+            <a:ext cx="491067" cy="262466"/>
+          </a:xfrm>
+          <a:prstGeom prst="rightArrow">
+            <a:avLst/>
+          </a:prstGeom>
+          <a:solidFill>
+            <a:srgbClr val="002060"/>
+          </a:solidFill>
+        </p:spPr>
+        <p:style>
+          <a:lnRef idx="1">
+            <a:schemeClr val="accent1"/>
+          </a:lnRef>
+          <a:fillRef idx="3">
+            <a:schemeClr val="accent1"/>
+          </a:fillRef>
+          <a:effectRef idx="2">
+            <a:schemeClr val="accent1"/>
+          </a:effectRef>
+          <a:fontRef idx="minor">
+            <a:schemeClr val="lt1"/>
+          </a:fontRef>
+        </p:style>
+        <p:txBody>
+          <a:bodyPr rtlCol="0" anchor="ctr"/>
+          <a:lstStyle/>
+          <a:p>
+            <a:pPr algn="ctr"/>
+            <a:endParaRPr lang="zh-TW" altLang="en-US"/>
+          </a:p>
+        </p:txBody>
+      </p:sp>
+      <p:sp>
+        <p:nvSpPr>
+          <p:cNvPr id="25" name="矩形 24"/>
+          <p:cNvSpPr/>
+          <p:nvPr/>
+        </p:nvSpPr>
+        <p:spPr>
+          <a:xfrm>
+            <a:off x="6332370" y="2599267"/>
+            <a:ext cx="1796326" cy="369332"/>
+          </a:xfrm>
+          <a:prstGeom prst="rect">
+            <a:avLst/>
+          </a:prstGeom>
+        </p:spPr>
+        <p:txBody>
+          <a:bodyPr wrap="none">
+            <a:spAutoFit/>
+          </a:bodyPr>
+          <a:lstStyle/>
+          <a:p>
+            <a:r>
+              <a:rPr lang="en-US" altLang="zh-TW" dirty="0" smtClean="0"/>
+              <a:t>Weak classifier </a:t>
+            </a:r>
+            <a:endParaRPr lang="zh-TW" altLang="en-US" dirty="0"/>
+          </a:p>
+        </p:txBody>
+      </p:sp>
+      <p:sp>
+        <p:nvSpPr>
+          <p:cNvPr id="26" name="橢圓 25"/>
+          <p:cNvSpPr/>
+          <p:nvPr/>
+        </p:nvSpPr>
+        <p:spPr>
+          <a:xfrm>
+            <a:off x="2607714" y="3852333"/>
+            <a:ext cx="3649163" cy="1456266"/>
+          </a:xfrm>
+          <a:prstGeom prst="ellipse">
+            <a:avLst/>
+          </a:prstGeom>
+          <a:noFill/>
+          <a:ln w="12700"/>
+          <a:effectLst/>
+        </p:spPr>
+        <p:style>
+          <a:lnRef idx="1">
+            <a:schemeClr val="accent1"/>
+          </a:lnRef>
+          <a:fillRef idx="3">
+            <a:schemeClr val="accent1"/>
+          </a:fillRef>
+          <a:effectRef idx="2">
+            <a:schemeClr val="accent1"/>
+          </a:effectRef>
+          <a:fontRef idx="minor">
+            <a:schemeClr val="lt1"/>
+          </a:fontRef>
+        </p:style>
+        <p:txBody>
+          <a:bodyPr rtlCol="0" anchor="ctr"/>
+          <a:lstStyle/>
+          <a:p>
+            <a:r>
+              <a:rPr lang="en-US" altLang="zh-TW" dirty="0" smtClean="0">
+                <a:solidFill>
+                  <a:schemeClr val="tx1"/>
+                </a:solidFill>
+              </a:rPr>
+              <a:t>Weak classifier pool </a:t>
+            </a:r>
+            <a:endParaRPr lang="zh-TW" altLang="en-US" dirty="0">
+              <a:solidFill>
+                <a:schemeClr val="tx1"/>
+              </a:solidFill>
+            </a:endParaRPr>
+          </a:p>
+        </p:txBody>
+      </p:sp>
+      <p:sp>
+        <p:nvSpPr>
+          <p:cNvPr id="28" name="向右箭號 27"/>
+          <p:cNvSpPr/>
+          <p:nvPr/>
+        </p:nvSpPr>
+        <p:spPr>
+          <a:xfrm rot="16200000">
+            <a:off x="4074900" y="3340288"/>
+            <a:ext cx="478796" cy="351216"/>
+          </a:xfrm>
+          <a:prstGeom prst="rightArrow">
+            <a:avLst/>
+          </a:prstGeom>
+          <a:noFill/>
+          <a:ln w="12700"/>
+        </p:spPr>
+        <p:style>
+          <a:lnRef idx="1">
+            <a:schemeClr val="accent1"/>
+          </a:lnRef>
+          <a:fillRef idx="3">
+            <a:schemeClr val="accent1"/>
+          </a:fillRef>
+          <a:effectRef idx="2">
+            <a:schemeClr val="accent1"/>
+          </a:effectRef>
+          <a:fontRef idx="minor">
+            <a:schemeClr val="lt1"/>
+          </a:fontRef>
+        </p:style>
+        <p:txBody>
+          <a:bodyPr rtlCol="0" anchor="ctr"/>
+          <a:lstStyle/>
+          <a:p>
+            <a:pPr algn="ctr"/>
+            <a:endParaRPr lang="zh-TW" altLang="en-US"/>
+          </a:p>
+        </p:txBody>
+      </p:sp>
+    </p:spTree>
+    <p:extLst>
+      <p:ext uri="{BB962C8B-B14F-4D97-AF65-F5344CB8AC3E}">
+        <p14:creationId xmlns="" xmlns:p14="http://schemas.microsoft.com/office/powerpoint/2010/main" val="3040030372"/>
       </p:ext>
     </p:extLst>
   </p:cSld>
@@ -7360,441 +7251,6 @@
         <p:spPr>
           <a:xfrm>
             <a:off x="228600" y="986319"/>
-            <a:ext cx="8689622" cy="369332"/>
-          </a:xfrm>
-        </p:spPr>
-        <p:txBody>
-          <a:bodyPr/>
-          <a:lstStyle/>
-          <a:p>
-            <a:pPr marL="1200150" lvl="1" indent="-457200">
-              <a:buFont typeface="Wingdings" pitchFamily="2" charset="2"/>
-              <a:buChar char="l"/>
-            </a:pPr>
-            <a:r>
-              <a:rPr lang="en-US" altLang="zh-TW" sz="2400" dirty="0" smtClean="0">
-                <a:latin typeface="Arial"/>
-              </a:rPr>
-              <a:t>Find the weak classifier with minimum error</a:t>
-            </a:r>
-          </a:p>
-        </p:txBody>
-      </p:sp>
-      <p:sp>
-        <p:nvSpPr>
-          <p:cNvPr id="4" name="Title 3"/>
-          <p:cNvSpPr>
-            <a:spLocks noGrp="1"/>
-          </p:cNvSpPr>
-          <p:nvPr>
-            <p:ph type="title"/>
-          </p:nvPr>
-        </p:nvSpPr>
-        <p:spPr>
-          <a:xfrm>
-            <a:off x="228600" y="228600"/>
-            <a:ext cx="4137928" cy="492443"/>
-          </a:xfrm>
-        </p:spPr>
-        <p:txBody>
-          <a:bodyPr/>
-          <a:lstStyle/>
-          <a:p>
-            <a:pPr marL="342900" indent="-342900"/>
-            <a:r>
-              <a:rPr lang="en-US" altLang="zh-TW" sz="3200" dirty="0" smtClean="0">
-                <a:solidFill>
-                  <a:schemeClr val="tx1"/>
-                </a:solidFill>
-                <a:latin typeface="+mj-lt"/>
-              </a:rPr>
-              <a:t>Weak </a:t>
-            </a:r>
-            <a:r>
-              <a:rPr lang="en-US" altLang="zh-TW" sz="3200" dirty="0" smtClean="0">
-                <a:solidFill>
-                  <a:schemeClr val="tx1"/>
-                </a:solidFill>
-                <a:latin typeface="+mj-lt"/>
-              </a:rPr>
-              <a:t>classifier learner</a:t>
-            </a:r>
-            <a:endParaRPr lang="en-US" altLang="zh-TW" sz="3200" dirty="0">
-              <a:solidFill>
-                <a:schemeClr val="tx1"/>
-              </a:solidFill>
-              <a:latin typeface="+mj-lt"/>
-            </a:endParaRPr>
-          </a:p>
-        </p:txBody>
-      </p:sp>
-      <p:sp>
-        <p:nvSpPr>
-          <p:cNvPr id="21" name="圓角矩形 20"/>
-          <p:cNvSpPr/>
-          <p:nvPr/>
-        </p:nvSpPr>
-        <p:spPr>
-          <a:xfrm>
-            <a:off x="569227" y="2099733"/>
-            <a:ext cx="1674439" cy="1159934"/>
-          </a:xfrm>
-          <a:prstGeom prst="roundRect">
-            <a:avLst/>
-          </a:prstGeom>
-          <a:noFill/>
-          <a:ln w="12700" cmpd="sng"/>
-          <a:effectLst/>
-        </p:spPr>
-        <p:style>
-          <a:lnRef idx="1">
-            <a:schemeClr val="accent1"/>
-          </a:lnRef>
-          <a:fillRef idx="3">
-            <a:schemeClr val="accent1"/>
-          </a:fillRef>
-          <a:effectRef idx="2">
-            <a:schemeClr val="accent1"/>
-          </a:effectRef>
-          <a:fontRef idx="minor">
-            <a:schemeClr val="lt1"/>
-          </a:fontRef>
-        </p:style>
-        <p:txBody>
-          <a:bodyPr rtlCol="0" anchor="ctr"/>
-          <a:lstStyle/>
-          <a:p>
-            <a:pPr algn="ctr"/>
-            <a:r>
-              <a:rPr lang="en-US" altLang="zh-TW" dirty="0" smtClean="0">
-                <a:solidFill>
-                  <a:schemeClr val="tx1"/>
-                </a:solidFill>
-              </a:rPr>
-              <a:t>Data</a:t>
-            </a:r>
-            <a:endParaRPr lang="zh-TW" altLang="en-US" dirty="0">
-              <a:solidFill>
-                <a:schemeClr val="tx1"/>
-              </a:solidFill>
-            </a:endParaRPr>
-          </a:p>
-        </p:txBody>
-      </p:sp>
-      <p:sp>
-        <p:nvSpPr>
-          <p:cNvPr id="22" name="矩形 21"/>
-          <p:cNvSpPr/>
-          <p:nvPr/>
-        </p:nvSpPr>
-        <p:spPr>
-          <a:xfrm>
-            <a:off x="3316661" y="2235205"/>
-            <a:ext cx="2099734" cy="931332"/>
-          </a:xfrm>
-          <a:prstGeom prst="rect">
-            <a:avLst/>
-          </a:prstGeom>
-          <a:noFill/>
-          <a:ln w="12700"/>
-          <a:effectLst/>
-        </p:spPr>
-        <p:style>
-          <a:lnRef idx="1">
-            <a:schemeClr val="accent1"/>
-          </a:lnRef>
-          <a:fillRef idx="3">
-            <a:schemeClr val="accent1"/>
-          </a:fillRef>
-          <a:effectRef idx="2">
-            <a:schemeClr val="accent1"/>
-          </a:effectRef>
-          <a:fontRef idx="minor">
-            <a:schemeClr val="lt1"/>
-          </a:fontRef>
-        </p:style>
-        <p:txBody>
-          <a:bodyPr rtlCol="0" anchor="ctr"/>
-          <a:lstStyle/>
-          <a:p>
-            <a:pPr algn="ctr"/>
-            <a:r>
-              <a:rPr lang="en-US" altLang="zh-TW" dirty="0" smtClean="0">
-                <a:solidFill>
-                  <a:schemeClr val="tx1"/>
-                </a:solidFill>
-              </a:rPr>
-              <a:t>Weak classifier learner</a:t>
-            </a:r>
-            <a:endParaRPr lang="zh-TW" altLang="en-US" dirty="0">
-              <a:solidFill>
-                <a:schemeClr val="tx1"/>
-              </a:solidFill>
-            </a:endParaRPr>
-          </a:p>
-        </p:txBody>
-      </p:sp>
-      <p:sp>
-        <p:nvSpPr>
-          <p:cNvPr id="23" name="向右箭號 22"/>
-          <p:cNvSpPr/>
-          <p:nvPr/>
-        </p:nvSpPr>
-        <p:spPr>
-          <a:xfrm>
-            <a:off x="2429938" y="2599267"/>
-            <a:ext cx="491067" cy="262466"/>
-          </a:xfrm>
-          <a:prstGeom prst="rightArrow">
-            <a:avLst/>
-          </a:prstGeom>
-          <a:solidFill>
-            <a:srgbClr val="002060"/>
-          </a:solidFill>
-        </p:spPr>
-        <p:style>
-          <a:lnRef idx="1">
-            <a:schemeClr val="accent1"/>
-          </a:lnRef>
-          <a:fillRef idx="3">
-            <a:schemeClr val="accent1"/>
-          </a:fillRef>
-          <a:effectRef idx="2">
-            <a:schemeClr val="accent1"/>
-          </a:effectRef>
-          <a:fontRef idx="minor">
-            <a:schemeClr val="lt1"/>
-          </a:fontRef>
-        </p:style>
-        <p:txBody>
-          <a:bodyPr rtlCol="0" anchor="ctr"/>
-          <a:lstStyle/>
-          <a:p>
-            <a:pPr algn="ctr"/>
-            <a:endParaRPr lang="zh-TW" altLang="en-US"/>
-          </a:p>
-        </p:txBody>
-      </p:sp>
-      <p:sp>
-        <p:nvSpPr>
-          <p:cNvPr id="24" name="向右箭號 23"/>
-          <p:cNvSpPr/>
-          <p:nvPr/>
-        </p:nvSpPr>
-        <p:spPr>
-          <a:xfrm>
-            <a:off x="5638805" y="2599267"/>
-            <a:ext cx="491067" cy="262466"/>
-          </a:xfrm>
-          <a:prstGeom prst="rightArrow">
-            <a:avLst/>
-          </a:prstGeom>
-          <a:solidFill>
-            <a:srgbClr val="002060"/>
-          </a:solidFill>
-        </p:spPr>
-        <p:style>
-          <a:lnRef idx="1">
-            <a:schemeClr val="accent1"/>
-          </a:lnRef>
-          <a:fillRef idx="3">
-            <a:schemeClr val="accent1"/>
-          </a:fillRef>
-          <a:effectRef idx="2">
-            <a:schemeClr val="accent1"/>
-          </a:effectRef>
-          <a:fontRef idx="minor">
-            <a:schemeClr val="lt1"/>
-          </a:fontRef>
-        </p:style>
-        <p:txBody>
-          <a:bodyPr rtlCol="0" anchor="ctr"/>
-          <a:lstStyle/>
-          <a:p>
-            <a:pPr algn="ctr"/>
-            <a:endParaRPr lang="zh-TW" altLang="en-US"/>
-          </a:p>
-        </p:txBody>
-      </p:sp>
-      <p:sp>
-        <p:nvSpPr>
-          <p:cNvPr id="25" name="矩形 24"/>
-          <p:cNvSpPr/>
-          <p:nvPr/>
-        </p:nvSpPr>
-        <p:spPr>
-          <a:xfrm>
-            <a:off x="6332370" y="2599267"/>
-            <a:ext cx="1796326" cy="369332"/>
-          </a:xfrm>
-          <a:prstGeom prst="rect">
-            <a:avLst/>
-          </a:prstGeom>
-        </p:spPr>
-        <p:txBody>
-          <a:bodyPr wrap="none">
-            <a:spAutoFit/>
-          </a:bodyPr>
-          <a:lstStyle/>
-          <a:p>
-            <a:r>
-              <a:rPr lang="en-US" altLang="zh-TW" dirty="0" smtClean="0"/>
-              <a:t>Weak classifier </a:t>
-            </a:r>
-            <a:endParaRPr lang="zh-TW" altLang="en-US" dirty="0"/>
-          </a:p>
-        </p:txBody>
-      </p:sp>
-      <p:sp>
-        <p:nvSpPr>
-          <p:cNvPr id="26" name="橢圓 25"/>
-          <p:cNvSpPr/>
-          <p:nvPr/>
-        </p:nvSpPr>
-        <p:spPr>
-          <a:xfrm>
-            <a:off x="2607714" y="3852333"/>
-            <a:ext cx="3649163" cy="1456266"/>
-          </a:xfrm>
-          <a:prstGeom prst="ellipse">
-            <a:avLst/>
-          </a:prstGeom>
-          <a:noFill/>
-          <a:ln w="12700"/>
-          <a:effectLst/>
-        </p:spPr>
-        <p:style>
-          <a:lnRef idx="1">
-            <a:schemeClr val="accent1"/>
-          </a:lnRef>
-          <a:fillRef idx="3">
-            <a:schemeClr val="accent1"/>
-          </a:fillRef>
-          <a:effectRef idx="2">
-            <a:schemeClr val="accent1"/>
-          </a:effectRef>
-          <a:fontRef idx="minor">
-            <a:schemeClr val="lt1"/>
-          </a:fontRef>
-        </p:style>
-        <p:txBody>
-          <a:bodyPr rtlCol="0" anchor="ctr"/>
-          <a:lstStyle/>
-          <a:p>
-            <a:r>
-              <a:rPr lang="en-US" altLang="zh-TW" dirty="0" smtClean="0">
-                <a:solidFill>
-                  <a:schemeClr val="tx1"/>
-                </a:solidFill>
-              </a:rPr>
-              <a:t>Weak </a:t>
-            </a:r>
-            <a:r>
-              <a:rPr lang="en-US" altLang="zh-TW" dirty="0" smtClean="0">
-                <a:solidFill>
-                  <a:schemeClr val="tx1"/>
-                </a:solidFill>
-              </a:rPr>
-              <a:t>classifier pool </a:t>
-            </a:r>
-            <a:endParaRPr lang="zh-TW" altLang="en-US" dirty="0">
-              <a:solidFill>
-                <a:schemeClr val="tx1"/>
-              </a:solidFill>
-            </a:endParaRPr>
-          </a:p>
-        </p:txBody>
-      </p:sp>
-      <p:sp>
-        <p:nvSpPr>
-          <p:cNvPr id="28" name="向右箭號 27"/>
-          <p:cNvSpPr/>
-          <p:nvPr/>
-        </p:nvSpPr>
-        <p:spPr>
-          <a:xfrm rot="16200000">
-            <a:off x="4074900" y="3340288"/>
-            <a:ext cx="478796" cy="351216"/>
-          </a:xfrm>
-          <a:prstGeom prst="rightArrow">
-            <a:avLst/>
-          </a:prstGeom>
-          <a:noFill/>
-          <a:ln w="12700"/>
-        </p:spPr>
-        <p:style>
-          <a:lnRef idx="1">
-            <a:schemeClr val="accent1"/>
-          </a:lnRef>
-          <a:fillRef idx="3">
-            <a:schemeClr val="accent1"/>
-          </a:fillRef>
-          <a:effectRef idx="2">
-            <a:schemeClr val="accent1"/>
-          </a:effectRef>
-          <a:fontRef idx="minor">
-            <a:schemeClr val="lt1"/>
-          </a:fontRef>
-        </p:style>
-        <p:txBody>
-          <a:bodyPr rtlCol="0" anchor="ctr"/>
-          <a:lstStyle/>
-          <a:p>
-            <a:pPr algn="ctr"/>
-            <a:endParaRPr lang="zh-TW" altLang="en-US"/>
-          </a:p>
-        </p:txBody>
-      </p:sp>
-    </p:spTree>
-    <p:extLst>
-      <p:ext uri="{BB962C8B-B14F-4D97-AF65-F5344CB8AC3E}">
-        <p14:creationId xmlns:p14="http://schemas.microsoft.com/office/powerpoint/2010/main" xmlns="" val="3040030372"/>
-      </p:ext>
-    </p:extLst>
-  </p:cSld>
-  <p:clrMapOvr>
-    <a:masterClrMapping/>
-  </p:clrMapOvr>
-  <p:timing>
-    <p:tnLst>
-      <p:par>
-        <p:cTn id="1" dur="indefinite" restart="never" nodeType="tmRoot"/>
-      </p:par>
-    </p:tnLst>
-  </p:timing>
-</p:sld>
-</file>
-
-<file path=ppt/slides/slide22.xml><?xml version="1.0" encoding="utf-8"?>
-<p:sld xmlns:a="http://schemas.openxmlformats.org/drawingml/2006/main" xmlns:r="http://schemas.openxmlformats.org/officeDocument/2006/relationships" xmlns:p="http://schemas.openxmlformats.org/presentationml/2006/main">
-  <p:cSld>
-    <p:spTree>
-      <p:nvGrpSpPr>
-        <p:cNvPr id="1" name=""/>
-        <p:cNvGrpSpPr/>
-        <p:nvPr/>
-      </p:nvGrpSpPr>
-      <p:grpSpPr>
-        <a:xfrm>
-          <a:off x="0" y="0"/>
-          <a:ext cx="0" cy="0"/>
-          <a:chOff x="0" y="0"/>
-          <a:chExt cx="0" cy="0"/>
-        </a:xfrm>
-      </p:grpSpPr>
-      <p:sp>
-        <p:nvSpPr>
-          <p:cNvPr id="3" name="Content Placeholder 2"/>
-          <p:cNvSpPr>
-            <a:spLocks noGrp="1"/>
-          </p:cNvSpPr>
-          <p:nvPr>
-            <p:ph idx="1"/>
-          </p:nvPr>
-        </p:nvSpPr>
-        <p:spPr>
-          <a:xfrm>
-            <a:off x="228600" y="986319"/>
             <a:ext cx="8689622" cy="763286"/>
           </a:xfrm>
         </p:spPr>
@@ -7992,15 +7448,7 @@
             </a:pPr>
             <a:r>
               <a:rPr lang="en-US" altLang="zh-TW" sz="2400" dirty="0" smtClean="0"/>
-              <a:t>Will you sleep well or bad tonight? {well,</a:t>
-            </a:r>
-            <a:r>
-              <a:rPr lang="en-US" altLang="zh-TW" sz="2400" dirty="0" smtClean="0"/>
-              <a:t> bad</a:t>
-            </a:r>
-            <a:r>
-              <a:rPr lang="en-US" altLang="zh-TW" sz="2400" dirty="0" smtClean="0"/>
-              <a:t>}</a:t>
+              <a:t>Will you sleep well or bad tonight? {well, bad}</a:t>
             </a:r>
           </a:p>
           <a:p>
@@ -8265,11 +7713,7 @@
           <a:p>
             <a:r>
               <a:rPr lang="en-US" altLang="zh-TW" dirty="0" smtClean="0"/>
-              <a:t>-</a:t>
-            </a:r>
-            <a:r>
-              <a:rPr lang="en-US" altLang="zh-TW" dirty="0" smtClean="0"/>
-              <a:t>1</a:t>
+              <a:t>-1</a:t>
             </a:r>
             <a:endParaRPr lang="zh-TW" altLang="en-US" dirty="0"/>
           </a:p>
@@ -8278,7 +7722,7 @@
     </p:spTree>
     <p:extLst>
       <p:ext uri="{BB962C8B-B14F-4D97-AF65-F5344CB8AC3E}">
-        <p14:creationId xmlns:p14="http://schemas.microsoft.com/office/powerpoint/2010/main" xmlns="" val="3040030372"/>
+        <p14:creationId xmlns="" xmlns:p14="http://schemas.microsoft.com/office/powerpoint/2010/main" val="3040030372"/>
       </p:ext>
     </p:extLst>
   </p:cSld>
@@ -8291,6 +7735,754 @@
         <p:cTn id="1" dur="indefinite" restart="never" nodeType="tmRoot"/>
       </p:par>
     </p:tnLst>
+  </p:timing>
+</p:sld>
+</file>
+
+<file path=ppt/slides/slide22.xml><?xml version="1.0" encoding="utf-8"?>
+<p:sld xmlns:a="http://schemas.openxmlformats.org/drawingml/2006/main" xmlns:r="http://schemas.openxmlformats.org/officeDocument/2006/relationships" xmlns:p="http://schemas.openxmlformats.org/presentationml/2006/main">
+  <p:cSld>
+    <p:spTree>
+      <p:nvGrpSpPr>
+        <p:cNvPr id="1" name=""/>
+        <p:cNvGrpSpPr/>
+        <p:nvPr/>
+      </p:nvGrpSpPr>
+      <p:grpSpPr>
+        <a:xfrm>
+          <a:off x="0" y="0"/>
+          <a:ext cx="0" cy="0"/>
+          <a:chOff x="0" y="0"/>
+          <a:chExt cx="0" cy="0"/>
+        </a:xfrm>
+      </p:grpSpPr>
+      <p:sp>
+        <p:nvSpPr>
+          <p:cNvPr id="4" name="Title 3"/>
+          <p:cNvSpPr>
+            <a:spLocks noGrp="1"/>
+          </p:cNvSpPr>
+          <p:nvPr>
+            <p:ph type="title"/>
+          </p:nvPr>
+        </p:nvSpPr>
+        <p:spPr>
+          <a:xfrm>
+            <a:off x="228600" y="228600"/>
+            <a:ext cx="4412042" cy="492443"/>
+          </a:xfrm>
+        </p:spPr>
+        <p:txBody>
+          <a:bodyPr/>
+          <a:lstStyle/>
+          <a:p>
+            <a:pPr marL="342900" indent="-342900"/>
+            <a:r>
+              <a:rPr lang="en-US" altLang="zh-TW" sz="3200" dirty="0" smtClean="0">
+                <a:solidFill>
+                  <a:schemeClr val="tx1"/>
+                </a:solidFill>
+                <a:latin typeface="+mj-lt"/>
+              </a:rPr>
+              <a:t>Weak </a:t>
+            </a:r>
+            <a:r>
+              <a:rPr lang="en-US" altLang="zh-TW" sz="3200" dirty="0" smtClean="0">
+                <a:solidFill>
+                  <a:schemeClr val="tx1"/>
+                </a:solidFill>
+                <a:latin typeface="+mj-lt"/>
+              </a:rPr>
+              <a:t>classifier example</a:t>
+            </a:r>
+            <a:endParaRPr lang="en-US" altLang="zh-TW" sz="3200" dirty="0">
+              <a:solidFill>
+                <a:schemeClr val="tx1"/>
+              </a:solidFill>
+              <a:latin typeface="+mj-lt"/>
+            </a:endParaRPr>
+          </a:p>
+        </p:txBody>
+      </p:sp>
+      <p:pic>
+        <p:nvPicPr>
+          <p:cNvPr id="38913" name="Picture 1" descr="C:\Users\LiangLeon\Pictures\GARMIN\weak_classifier.png"/>
+          <p:cNvPicPr>
+            <a:picLocks noChangeAspect="1" noChangeArrowheads="1"/>
+          </p:cNvPicPr>
+          <p:nvPr/>
+        </p:nvPicPr>
+        <p:blipFill>
+          <a:blip r:embed="rId2"/>
+          <a:srcRect/>
+          <a:stretch>
+            <a:fillRect/>
+          </a:stretch>
+        </p:blipFill>
+        <p:spPr bwMode="auto">
+          <a:xfrm>
+            <a:off x="1574800" y="939781"/>
+            <a:ext cx="5751878" cy="4377575"/>
+          </a:xfrm>
+          <a:prstGeom prst="rect">
+            <a:avLst/>
+          </a:prstGeom>
+          <a:noFill/>
+        </p:spPr>
+      </p:pic>
+      <p:cxnSp>
+        <p:nvCxnSpPr>
+          <p:cNvPr id="22" name="直線接點 21"/>
+          <p:cNvCxnSpPr/>
+          <p:nvPr/>
+        </p:nvCxnSpPr>
+        <p:spPr>
+          <a:xfrm flipV="1">
+            <a:off x="3530597" y="1032915"/>
+            <a:ext cx="16933" cy="4038599"/>
+          </a:xfrm>
+          <a:prstGeom prst="line">
+            <a:avLst/>
+          </a:prstGeom>
+          <a:ln>
+            <a:solidFill>
+              <a:schemeClr val="bg1">
+                <a:lumMod val="50000"/>
+              </a:schemeClr>
+            </a:solidFill>
+          </a:ln>
+        </p:spPr>
+        <p:style>
+          <a:lnRef idx="2">
+            <a:schemeClr val="accent1"/>
+          </a:lnRef>
+          <a:fillRef idx="0">
+            <a:schemeClr val="accent1"/>
+          </a:fillRef>
+          <a:effectRef idx="1">
+            <a:schemeClr val="accent1"/>
+          </a:effectRef>
+          <a:fontRef idx="minor">
+            <a:schemeClr val="tx1"/>
+          </a:fontRef>
+        </p:style>
+      </p:cxnSp>
+      <p:cxnSp>
+        <p:nvCxnSpPr>
+          <p:cNvPr id="25" name="直線接點 24"/>
+          <p:cNvCxnSpPr/>
+          <p:nvPr/>
+        </p:nvCxnSpPr>
+        <p:spPr>
+          <a:xfrm flipH="1">
+            <a:off x="1883235" y="4648183"/>
+            <a:ext cx="5367240" cy="0"/>
+          </a:xfrm>
+          <a:prstGeom prst="line">
+            <a:avLst/>
+          </a:prstGeom>
+          <a:ln>
+            <a:solidFill>
+              <a:schemeClr val="bg1">
+                <a:lumMod val="50000"/>
+              </a:schemeClr>
+            </a:solidFill>
+          </a:ln>
+        </p:spPr>
+        <p:style>
+          <a:lnRef idx="2">
+            <a:schemeClr val="accent1"/>
+          </a:lnRef>
+          <a:fillRef idx="0">
+            <a:schemeClr val="accent1"/>
+          </a:fillRef>
+          <a:effectRef idx="1">
+            <a:schemeClr val="accent1"/>
+          </a:effectRef>
+          <a:fontRef idx="minor">
+            <a:schemeClr val="tx1"/>
+          </a:fontRef>
+        </p:style>
+      </p:cxnSp>
+      <p:sp>
+        <p:nvSpPr>
+          <p:cNvPr id="36" name="矩形 35"/>
+          <p:cNvSpPr/>
+          <p:nvPr/>
+        </p:nvSpPr>
+        <p:spPr>
+          <a:xfrm>
+            <a:off x="4961466" y="1634067"/>
+            <a:ext cx="211667" cy="220133"/>
+          </a:xfrm>
+          <a:prstGeom prst="rect">
+            <a:avLst/>
+          </a:prstGeom>
+          <a:noFill/>
+          <a:ln w="19050">
+            <a:solidFill>
+              <a:srgbClr val="FF0000"/>
+            </a:solidFill>
+          </a:ln>
+          <a:effectLst/>
+        </p:spPr>
+        <p:style>
+          <a:lnRef idx="1">
+            <a:schemeClr val="accent1"/>
+          </a:lnRef>
+          <a:fillRef idx="3">
+            <a:schemeClr val="accent1"/>
+          </a:fillRef>
+          <a:effectRef idx="2">
+            <a:schemeClr val="accent1"/>
+          </a:effectRef>
+          <a:fontRef idx="minor">
+            <a:schemeClr val="lt1"/>
+          </a:fontRef>
+        </p:style>
+        <p:txBody>
+          <a:bodyPr rtlCol="0" anchor="ctr"/>
+          <a:lstStyle/>
+          <a:p>
+            <a:pPr algn="ctr"/>
+            <a:endParaRPr lang="zh-TW" altLang="en-US"/>
+          </a:p>
+        </p:txBody>
+      </p:sp>
+      <p:sp>
+        <p:nvSpPr>
+          <p:cNvPr id="37" name="矩形 36"/>
+          <p:cNvSpPr/>
+          <p:nvPr/>
+        </p:nvSpPr>
+        <p:spPr>
+          <a:xfrm>
+            <a:off x="4961466" y="4851381"/>
+            <a:ext cx="211667" cy="220133"/>
+          </a:xfrm>
+          <a:prstGeom prst="rect">
+            <a:avLst/>
+          </a:prstGeom>
+          <a:noFill/>
+          <a:ln w="19050">
+            <a:solidFill>
+              <a:srgbClr val="FF0000"/>
+            </a:solidFill>
+          </a:ln>
+          <a:effectLst/>
+        </p:spPr>
+        <p:style>
+          <a:lnRef idx="1">
+            <a:schemeClr val="accent1"/>
+          </a:lnRef>
+          <a:fillRef idx="3">
+            <a:schemeClr val="accent1"/>
+          </a:fillRef>
+          <a:effectRef idx="2">
+            <a:schemeClr val="accent1"/>
+          </a:effectRef>
+          <a:fontRef idx="minor">
+            <a:schemeClr val="lt1"/>
+          </a:fontRef>
+        </p:style>
+        <p:txBody>
+          <a:bodyPr rtlCol="0" anchor="ctr"/>
+          <a:lstStyle/>
+          <a:p>
+            <a:pPr algn="ctr"/>
+            <a:endParaRPr lang="zh-TW" altLang="en-US"/>
+          </a:p>
+        </p:txBody>
+      </p:sp>
+      <p:sp>
+        <p:nvSpPr>
+          <p:cNvPr id="38" name="矩形 37"/>
+          <p:cNvSpPr/>
+          <p:nvPr/>
+        </p:nvSpPr>
+        <p:spPr>
+          <a:xfrm>
+            <a:off x="6002866" y="4851381"/>
+            <a:ext cx="211667" cy="220133"/>
+          </a:xfrm>
+          <a:prstGeom prst="rect">
+            <a:avLst/>
+          </a:prstGeom>
+          <a:noFill/>
+          <a:ln w="19050">
+            <a:solidFill>
+              <a:srgbClr val="FF0000"/>
+            </a:solidFill>
+          </a:ln>
+          <a:effectLst/>
+        </p:spPr>
+        <p:style>
+          <a:lnRef idx="1">
+            <a:schemeClr val="accent1"/>
+          </a:lnRef>
+          <a:fillRef idx="3">
+            <a:schemeClr val="accent1"/>
+          </a:fillRef>
+          <a:effectRef idx="2">
+            <a:schemeClr val="accent1"/>
+          </a:effectRef>
+          <a:fontRef idx="minor">
+            <a:schemeClr val="lt1"/>
+          </a:fontRef>
+        </p:style>
+        <p:txBody>
+          <a:bodyPr rtlCol="0" anchor="ctr"/>
+          <a:lstStyle/>
+          <a:p>
+            <a:pPr algn="ctr"/>
+            <a:endParaRPr lang="zh-TW" altLang="en-US"/>
+          </a:p>
+        </p:txBody>
+      </p:sp>
+      <p:sp>
+        <p:nvSpPr>
+          <p:cNvPr id="39" name="矩形 38"/>
+          <p:cNvSpPr/>
+          <p:nvPr/>
+        </p:nvSpPr>
+        <p:spPr>
+          <a:xfrm>
+            <a:off x="2887133" y="2937933"/>
+            <a:ext cx="211667" cy="220133"/>
+          </a:xfrm>
+          <a:prstGeom prst="rect">
+            <a:avLst/>
+          </a:prstGeom>
+          <a:noFill/>
+          <a:ln w="19050">
+            <a:solidFill>
+              <a:srgbClr val="FF0000"/>
+            </a:solidFill>
+          </a:ln>
+          <a:effectLst/>
+        </p:spPr>
+        <p:style>
+          <a:lnRef idx="1">
+            <a:schemeClr val="accent1"/>
+          </a:lnRef>
+          <a:fillRef idx="3">
+            <a:schemeClr val="accent1"/>
+          </a:fillRef>
+          <a:effectRef idx="2">
+            <a:schemeClr val="accent1"/>
+          </a:effectRef>
+          <a:fontRef idx="minor">
+            <a:schemeClr val="lt1"/>
+          </a:fontRef>
+        </p:style>
+        <p:txBody>
+          <a:bodyPr rtlCol="0" anchor="ctr"/>
+          <a:lstStyle/>
+          <a:p>
+            <a:pPr algn="ctr"/>
+            <a:endParaRPr lang="zh-TW" altLang="en-US"/>
+          </a:p>
+        </p:txBody>
+      </p:sp>
+      <p:sp>
+        <p:nvSpPr>
+          <p:cNvPr id="40" name="矩形 39"/>
+          <p:cNvSpPr/>
+          <p:nvPr/>
+        </p:nvSpPr>
+        <p:spPr>
+          <a:xfrm>
+            <a:off x="1883235" y="3581401"/>
+            <a:ext cx="211667" cy="220133"/>
+          </a:xfrm>
+          <a:prstGeom prst="rect">
+            <a:avLst/>
+          </a:prstGeom>
+          <a:noFill/>
+          <a:ln w="19050">
+            <a:solidFill>
+              <a:srgbClr val="FF0000"/>
+            </a:solidFill>
+          </a:ln>
+          <a:effectLst/>
+        </p:spPr>
+        <p:style>
+          <a:lnRef idx="1">
+            <a:schemeClr val="accent1"/>
+          </a:lnRef>
+          <a:fillRef idx="3">
+            <a:schemeClr val="accent1"/>
+          </a:fillRef>
+          <a:effectRef idx="2">
+            <a:schemeClr val="accent1"/>
+          </a:effectRef>
+          <a:fontRef idx="minor">
+            <a:schemeClr val="lt1"/>
+          </a:fontRef>
+        </p:style>
+        <p:txBody>
+          <a:bodyPr rtlCol="0" anchor="ctr"/>
+          <a:lstStyle/>
+          <a:p>
+            <a:pPr algn="ctr"/>
+            <a:endParaRPr lang="zh-TW" altLang="en-US"/>
+          </a:p>
+        </p:txBody>
+      </p:sp>
+    </p:spTree>
+    <p:extLst>
+      <p:ext uri="{BB962C8B-B14F-4D97-AF65-F5344CB8AC3E}">
+        <p14:creationId xmlns="" xmlns:p14="http://schemas.microsoft.com/office/powerpoint/2010/main" val="3040030372"/>
+      </p:ext>
+    </p:extLst>
+  </p:cSld>
+  <p:clrMapOvr>
+    <a:masterClrMapping/>
+  </p:clrMapOvr>
+  <p:timing>
+    <p:tnLst>
+      <p:par>
+        <p:cTn id="1" dur="indefinite" restart="never" nodeType="tmRoot">
+          <p:childTnLst>
+            <p:seq concurrent="1" nextAc="seek">
+              <p:cTn id="2" dur="indefinite" nodeType="mainSeq">
+                <p:childTnLst>
+                  <p:par>
+                    <p:cTn id="3" fill="hold">
+                      <p:stCondLst>
+                        <p:cond delay="indefinite"/>
+                      </p:stCondLst>
+                      <p:childTnLst>
+                        <p:par>
+                          <p:cTn id="4" fill="hold">
+                            <p:stCondLst>
+                              <p:cond delay="0"/>
+                            </p:stCondLst>
+                            <p:childTnLst>
+                              <p:par>
+                                <p:cTn id="5" presetID="1" presetClass="entr" presetSubtype="0" fill="hold" nodeType="clickEffect">
+                                  <p:stCondLst>
+                                    <p:cond delay="0"/>
+                                  </p:stCondLst>
+                                  <p:childTnLst>
+                                    <p:set>
+                                      <p:cBhvr>
+                                        <p:cTn id="6" dur="1" fill="hold">
+                                          <p:stCondLst>
+                                            <p:cond delay="0"/>
+                                          </p:stCondLst>
+                                        </p:cTn>
+                                        <p:tgtEl>
+                                          <p:spTgt spid="22"/>
+                                        </p:tgtEl>
+                                        <p:attrNameLst>
+                                          <p:attrName>style.visibility</p:attrName>
+                                        </p:attrNameLst>
+                                      </p:cBhvr>
+                                      <p:to>
+                                        <p:strVal val="visible"/>
+                                      </p:to>
+                                    </p:set>
+                                  </p:childTnLst>
+                                </p:cTn>
+                              </p:par>
+                              <p:par>
+                                <p:cTn id="7" presetID="1" presetClass="entr" presetSubtype="0" fill="hold" grpId="0" nodeType="withEffect">
+                                  <p:stCondLst>
+                                    <p:cond delay="0"/>
+                                  </p:stCondLst>
+                                  <p:childTnLst>
+                                    <p:set>
+                                      <p:cBhvr>
+                                        <p:cTn id="8" dur="1" fill="hold">
+                                          <p:stCondLst>
+                                            <p:cond delay="0"/>
+                                          </p:stCondLst>
+                                        </p:cTn>
+                                        <p:tgtEl>
+                                          <p:spTgt spid="36"/>
+                                        </p:tgtEl>
+                                        <p:attrNameLst>
+                                          <p:attrName>style.visibility</p:attrName>
+                                        </p:attrNameLst>
+                                      </p:cBhvr>
+                                      <p:to>
+                                        <p:strVal val="visible"/>
+                                      </p:to>
+                                    </p:set>
+                                  </p:childTnLst>
+                                </p:cTn>
+                              </p:par>
+                              <p:par>
+                                <p:cTn id="9" presetID="1" presetClass="entr" presetSubtype="0" fill="hold" grpId="0" nodeType="withEffect">
+                                  <p:stCondLst>
+                                    <p:cond delay="0"/>
+                                  </p:stCondLst>
+                                  <p:childTnLst>
+                                    <p:set>
+                                      <p:cBhvr>
+                                        <p:cTn id="10" dur="1" fill="hold">
+                                          <p:stCondLst>
+                                            <p:cond delay="0"/>
+                                          </p:stCondLst>
+                                        </p:cTn>
+                                        <p:tgtEl>
+                                          <p:spTgt spid="37"/>
+                                        </p:tgtEl>
+                                        <p:attrNameLst>
+                                          <p:attrName>style.visibility</p:attrName>
+                                        </p:attrNameLst>
+                                      </p:cBhvr>
+                                      <p:to>
+                                        <p:strVal val="visible"/>
+                                      </p:to>
+                                    </p:set>
+                                  </p:childTnLst>
+                                </p:cTn>
+                              </p:par>
+                              <p:par>
+                                <p:cTn id="11" presetID="1" presetClass="entr" presetSubtype="0" fill="hold" grpId="0" nodeType="withEffect">
+                                  <p:stCondLst>
+                                    <p:cond delay="0"/>
+                                  </p:stCondLst>
+                                  <p:childTnLst>
+                                    <p:set>
+                                      <p:cBhvr>
+                                        <p:cTn id="12" dur="1" fill="hold">
+                                          <p:stCondLst>
+                                            <p:cond delay="0"/>
+                                          </p:stCondLst>
+                                        </p:cTn>
+                                        <p:tgtEl>
+                                          <p:spTgt spid="38"/>
+                                        </p:tgtEl>
+                                        <p:attrNameLst>
+                                          <p:attrName>style.visibility</p:attrName>
+                                        </p:attrNameLst>
+                                      </p:cBhvr>
+                                      <p:to>
+                                        <p:strVal val="visible"/>
+                                      </p:to>
+                                    </p:set>
+                                  </p:childTnLst>
+                                </p:cTn>
+                              </p:par>
+                            </p:childTnLst>
+                          </p:cTn>
+                        </p:par>
+                      </p:childTnLst>
+                    </p:cTn>
+                  </p:par>
+                  <p:par>
+                    <p:cTn id="13" fill="hold">
+                      <p:stCondLst>
+                        <p:cond delay="indefinite"/>
+                      </p:stCondLst>
+                      <p:childTnLst>
+                        <p:par>
+                          <p:cTn id="14" fill="hold">
+                            <p:stCondLst>
+                              <p:cond delay="0"/>
+                            </p:stCondLst>
+                            <p:childTnLst>
+                              <p:par>
+                                <p:cTn id="15" presetID="1" presetClass="exit" presetSubtype="0" fill="hold" nodeType="clickEffect">
+                                  <p:stCondLst>
+                                    <p:cond delay="0"/>
+                                  </p:stCondLst>
+                                  <p:childTnLst>
+                                    <p:set>
+                                      <p:cBhvr>
+                                        <p:cTn id="16" dur="1" fill="hold">
+                                          <p:stCondLst>
+                                            <p:cond delay="0"/>
+                                          </p:stCondLst>
+                                        </p:cTn>
+                                        <p:tgtEl>
+                                          <p:spTgt spid="22"/>
+                                        </p:tgtEl>
+                                        <p:attrNameLst>
+                                          <p:attrName>style.visibility</p:attrName>
+                                        </p:attrNameLst>
+                                      </p:cBhvr>
+                                      <p:to>
+                                        <p:strVal val="hidden"/>
+                                      </p:to>
+                                    </p:set>
+                                  </p:childTnLst>
+                                </p:cTn>
+                              </p:par>
+                              <p:par>
+                                <p:cTn id="17" presetID="1" presetClass="exit" presetSubtype="0" fill="hold" grpId="1" nodeType="withEffect">
+                                  <p:stCondLst>
+                                    <p:cond delay="0"/>
+                                  </p:stCondLst>
+                                  <p:childTnLst>
+                                    <p:set>
+                                      <p:cBhvr>
+                                        <p:cTn id="18" dur="1" fill="hold">
+                                          <p:stCondLst>
+                                            <p:cond delay="0"/>
+                                          </p:stCondLst>
+                                        </p:cTn>
+                                        <p:tgtEl>
+                                          <p:spTgt spid="37"/>
+                                        </p:tgtEl>
+                                        <p:attrNameLst>
+                                          <p:attrName>style.visibility</p:attrName>
+                                        </p:attrNameLst>
+                                      </p:cBhvr>
+                                      <p:to>
+                                        <p:strVal val="hidden"/>
+                                      </p:to>
+                                    </p:set>
+                                  </p:childTnLst>
+                                </p:cTn>
+                              </p:par>
+                              <p:par>
+                                <p:cTn id="19" presetID="1" presetClass="exit" presetSubtype="0" fill="hold" grpId="1" nodeType="withEffect">
+                                  <p:stCondLst>
+                                    <p:cond delay="0"/>
+                                  </p:stCondLst>
+                                  <p:childTnLst>
+                                    <p:set>
+                                      <p:cBhvr>
+                                        <p:cTn id="20" dur="1" fill="hold">
+                                          <p:stCondLst>
+                                            <p:cond delay="0"/>
+                                          </p:stCondLst>
+                                        </p:cTn>
+                                        <p:tgtEl>
+                                          <p:spTgt spid="38"/>
+                                        </p:tgtEl>
+                                        <p:attrNameLst>
+                                          <p:attrName>style.visibility</p:attrName>
+                                        </p:attrNameLst>
+                                      </p:cBhvr>
+                                      <p:to>
+                                        <p:strVal val="hidden"/>
+                                      </p:to>
+                                    </p:set>
+                                  </p:childTnLst>
+                                </p:cTn>
+                              </p:par>
+                              <p:par>
+                                <p:cTn id="21" presetID="1" presetClass="entr" presetSubtype="0" fill="hold" nodeType="withEffect">
+                                  <p:stCondLst>
+                                    <p:cond delay="0"/>
+                                  </p:stCondLst>
+                                  <p:childTnLst>
+                                    <p:set>
+                                      <p:cBhvr>
+                                        <p:cTn id="22" dur="1" fill="hold">
+                                          <p:stCondLst>
+                                            <p:cond delay="0"/>
+                                          </p:stCondLst>
+                                        </p:cTn>
+                                        <p:tgtEl>
+                                          <p:spTgt spid="25"/>
+                                        </p:tgtEl>
+                                        <p:attrNameLst>
+                                          <p:attrName>style.visibility</p:attrName>
+                                        </p:attrNameLst>
+                                      </p:cBhvr>
+                                      <p:to>
+                                        <p:strVal val="visible"/>
+                                      </p:to>
+                                    </p:set>
+                                  </p:childTnLst>
+                                </p:cTn>
+                              </p:par>
+                              <p:par>
+                                <p:cTn id="23" presetID="1" presetClass="entr" presetSubtype="0" fill="hold" grpId="0" nodeType="withEffect">
+                                  <p:stCondLst>
+                                    <p:cond delay="0"/>
+                                  </p:stCondLst>
+                                  <p:childTnLst>
+                                    <p:set>
+                                      <p:cBhvr>
+                                        <p:cTn id="24" dur="1" fill="hold">
+                                          <p:stCondLst>
+                                            <p:cond delay="0"/>
+                                          </p:stCondLst>
+                                        </p:cTn>
+                                        <p:tgtEl>
+                                          <p:spTgt spid="39"/>
+                                        </p:tgtEl>
+                                        <p:attrNameLst>
+                                          <p:attrName>style.visibility</p:attrName>
+                                        </p:attrNameLst>
+                                      </p:cBhvr>
+                                      <p:to>
+                                        <p:strVal val="visible"/>
+                                      </p:to>
+                                    </p:set>
+                                  </p:childTnLst>
+                                </p:cTn>
+                              </p:par>
+                              <p:par>
+                                <p:cTn id="25" presetID="1" presetClass="entr" presetSubtype="0" fill="hold" grpId="0" nodeType="withEffect">
+                                  <p:stCondLst>
+                                    <p:cond delay="0"/>
+                                  </p:stCondLst>
+                                  <p:childTnLst>
+                                    <p:set>
+                                      <p:cBhvr>
+                                        <p:cTn id="26" dur="1" fill="hold">
+                                          <p:stCondLst>
+                                            <p:cond delay="0"/>
+                                          </p:stCondLst>
+                                        </p:cTn>
+                                        <p:tgtEl>
+                                          <p:spTgt spid="40"/>
+                                        </p:tgtEl>
+                                        <p:attrNameLst>
+                                          <p:attrName>style.visibility</p:attrName>
+                                        </p:attrNameLst>
+                                      </p:cBhvr>
+                                      <p:to>
+                                        <p:strVal val="visible"/>
+                                      </p:to>
+                                    </p:set>
+                                  </p:childTnLst>
+                                </p:cTn>
+                              </p:par>
+                            </p:childTnLst>
+                          </p:cTn>
+                        </p:par>
+                      </p:childTnLst>
+                    </p:cTn>
+                  </p:par>
+                </p:childTnLst>
+              </p:cTn>
+              <p:prevCondLst>
+                <p:cond evt="onPrev" delay="0">
+                  <p:tgtEl>
+                    <p:sldTgt/>
+                  </p:tgtEl>
+                </p:cond>
+              </p:prevCondLst>
+              <p:nextCondLst>
+                <p:cond evt="onNext" delay="0">
+                  <p:tgtEl>
+                    <p:sldTgt/>
+                  </p:tgtEl>
+                </p:cond>
+              </p:nextCondLst>
+            </p:seq>
+          </p:childTnLst>
+        </p:cTn>
+      </p:par>
+    </p:tnLst>
+    <p:bldLst>
+      <p:bldP spid="36" grpId="0" animBg="1"/>
+      <p:bldP spid="37" grpId="0" animBg="1"/>
+      <p:bldP spid="37" grpId="1" animBg="1"/>
+      <p:bldP spid="38" grpId="0" animBg="1"/>
+      <p:bldP spid="38" grpId="1" animBg="1"/>
+      <p:bldP spid="39" grpId="0" animBg="1"/>
+      <p:bldP spid="40" grpId="0" animBg="1"/>
+    </p:bldLst>
   </p:timing>
 </p:sld>
 </file>
@@ -8398,16 +8590,7 @@
                 </a:solidFill>
                 <a:latin typeface="+mj-lt"/>
               </a:rPr>
-              <a:t>Weak </a:t>
-            </a:r>
-            <a:r>
-              <a:rPr lang="en-US" altLang="zh-TW" sz="3200" dirty="0" smtClean="0">
-                <a:solidFill>
-                  <a:schemeClr val="tx1"/>
-                </a:solidFill>
-                <a:latin typeface="+mj-lt"/>
-              </a:rPr>
-              <a:t>classifier</a:t>
+              <a:t>Weak classifier</a:t>
             </a:r>
             <a:endParaRPr lang="en-US" altLang="zh-TW" sz="3200" dirty="0">
               <a:solidFill>
@@ -8895,7 +9078,7 @@
     </p:spTree>
     <p:extLst>
       <p:ext uri="{BB962C8B-B14F-4D97-AF65-F5344CB8AC3E}">
-        <p14:creationId xmlns:p14="http://schemas.microsoft.com/office/powerpoint/2010/main" xmlns="" val="3040030372"/>
+        <p14:creationId xmlns="" xmlns:p14="http://schemas.microsoft.com/office/powerpoint/2010/main" val="3040030372"/>
       </p:ext>
     </p:extLst>
   </p:cSld>
@@ -9452,7 +9635,7 @@
     </p:spTree>
     <p:extLst>
       <p:ext uri="{BB962C8B-B14F-4D97-AF65-F5344CB8AC3E}">
-        <p14:creationId xmlns:p14="http://schemas.microsoft.com/office/powerpoint/2010/main" xmlns="" val="3427152478"/>
+        <p14:creationId xmlns="" xmlns:p14="http://schemas.microsoft.com/office/powerpoint/2010/main" val="3427152478"/>
       </p:ext>
     </p:extLst>
   </p:cSld>
@@ -9864,7 +10047,7 @@
     </p:spTree>
     <p:extLst>
       <p:ext uri="{BB962C8B-B14F-4D97-AF65-F5344CB8AC3E}">
-        <p14:creationId xmlns:p14="http://schemas.microsoft.com/office/powerpoint/2010/main" xmlns="" val="3427152478"/>
+        <p14:creationId xmlns="" xmlns:p14="http://schemas.microsoft.com/office/powerpoint/2010/main" val="3427152478"/>
       </p:ext>
     </p:extLst>
   </p:cSld>
@@ -9950,7 +10133,7 @@
     </p:spTree>
     <p:extLst>
       <p:ext uri="{BB962C8B-B14F-4D97-AF65-F5344CB8AC3E}">
-        <p14:creationId xmlns:p14="http://schemas.microsoft.com/office/powerpoint/2010/main" xmlns="" val="3792208418"/>
+        <p14:creationId xmlns="" xmlns:p14="http://schemas.microsoft.com/office/powerpoint/2010/main" val="3792208418"/>
       </p:ext>
     </p:extLst>
   </p:cSld>
@@ -9986,6 +10169,72 @@
       </p:grpSpPr>
       <p:sp>
         <p:nvSpPr>
+          <p:cNvPr id="8" name="文字方塊 7"/>
+          <p:cNvSpPr txBox="1"/>
+          <p:nvPr/>
+        </p:nvSpPr>
+        <p:spPr>
+          <a:xfrm>
+            <a:off x="4991663" y="1905000"/>
+            <a:ext cx="2089033" cy="1200329"/>
+          </a:xfrm>
+          <a:prstGeom prst="rect">
+            <a:avLst/>
+          </a:prstGeom>
+          <a:noFill/>
+          <a:ln>
+            <a:noFill/>
+          </a:ln>
+        </p:spPr>
+        <p:txBody>
+          <a:bodyPr wrap="none" rtlCol="0">
+            <a:spAutoFit/>
+          </a:bodyPr>
+          <a:lstStyle/>
+          <a:p>
+            <a:pPr>
+              <a:buFont typeface="Wingdings" pitchFamily="2" charset="2"/>
+              <a:buChar char="l"/>
+            </a:pPr>
+            <a:r>
+              <a:rPr lang="en-US" altLang="zh-TW" dirty="0" smtClean="0"/>
+              <a:t>Rectangle shape</a:t>
+            </a:r>
+          </a:p>
+          <a:p>
+            <a:pPr>
+              <a:buFont typeface="Wingdings" pitchFamily="2" charset="2"/>
+              <a:buChar char="l"/>
+            </a:pPr>
+            <a:r>
+              <a:rPr lang="en-US" altLang="zh-TW" dirty="0" smtClean="0"/>
+              <a:t>Symmetry</a:t>
+            </a:r>
+          </a:p>
+          <a:p>
+            <a:pPr>
+              <a:buFont typeface="Wingdings" pitchFamily="2" charset="2"/>
+              <a:buChar char="l"/>
+            </a:pPr>
+            <a:r>
+              <a:rPr lang="en-US" altLang="zh-TW" dirty="0" smtClean="0"/>
+              <a:t>Entropy</a:t>
+            </a:r>
+          </a:p>
+          <a:p>
+            <a:pPr>
+              <a:buFont typeface="Wingdings" pitchFamily="2" charset="2"/>
+              <a:buChar char="l"/>
+            </a:pPr>
+            <a:r>
+              <a:rPr lang="en-US" altLang="zh-TW" dirty="0" smtClean="0"/>
+              <a:t>Contrast</a:t>
+            </a:r>
+          </a:p>
+        </p:txBody>
+      </p:sp>
+      <p:sp>
+        <p:nvSpPr>
           <p:cNvPr id="4" name="Title 3"/>
           <p:cNvSpPr>
             <a:spLocks noGrp="1"/>
@@ -9997,7 +10246,7 @@
         <p:spPr>
           <a:xfrm>
             <a:off x="228600" y="228600"/>
-            <a:ext cx="4873129" cy="492443"/>
+            <a:ext cx="6535443" cy="492443"/>
           </a:xfrm>
         </p:spPr>
         <p:txBody>
@@ -10011,7 +10260,7 @@
                 </a:solidFill>
                 <a:latin typeface="+mj-lt"/>
               </a:rPr>
-              <a:t>How computers see a car?</a:t>
+              <a:t>How to teach machine to see a car?</a:t>
             </a:r>
             <a:endParaRPr lang="en-US" sz="3200" b="0" dirty="0">
               <a:solidFill>
@@ -10099,8 +10348,8 @@
         </p:blipFill>
         <p:spPr bwMode="auto">
           <a:xfrm>
-            <a:off x="4991663" y="1905000"/>
-            <a:ext cx="3796388" cy="3270490"/>
+            <a:off x="4878550" y="1905000"/>
+            <a:ext cx="3975425" cy="3270490"/>
           </a:xfrm>
           <a:prstGeom prst="rect">
             <a:avLst/>
@@ -10131,7 +10380,7 @@
         </p:blipFill>
         <p:spPr bwMode="auto">
           <a:xfrm>
-            <a:off x="723575" y="1905000"/>
+            <a:off x="723880" y="1905000"/>
             <a:ext cx="3796388" cy="3270490"/>
           </a:xfrm>
           <a:prstGeom prst="rect">
@@ -10149,7 +10398,7 @@
     </p:spTree>
     <p:extLst>
       <p:ext uri="{BB962C8B-B14F-4D97-AF65-F5344CB8AC3E}">
-        <p14:creationId xmlns:p14="http://schemas.microsoft.com/office/powerpoint/2010/main" xmlns="" val="1692470345"/>
+        <p14:creationId xmlns="" xmlns:p14="http://schemas.microsoft.com/office/powerpoint/2010/main" val="1692470345"/>
       </p:ext>
     </p:extLst>
   </p:cSld>
@@ -10159,9 +10408,135 @@
   <p:timing>
     <p:tnLst>
       <p:par>
-        <p:cTn id="1" dur="indefinite" restart="never" nodeType="tmRoot"/>
+        <p:cTn id="1" dur="indefinite" restart="never" nodeType="tmRoot">
+          <p:childTnLst>
+            <p:seq concurrent="1" nextAc="seek">
+              <p:cTn id="2" dur="indefinite" nodeType="mainSeq">
+                <p:childTnLst>
+                  <p:par>
+                    <p:cTn id="3" fill="hold">
+                      <p:stCondLst>
+                        <p:cond delay="indefinite"/>
+                      </p:stCondLst>
+                      <p:childTnLst>
+                        <p:par>
+                          <p:cTn id="4" fill="hold">
+                            <p:stCondLst>
+                              <p:cond delay="0"/>
+                            </p:stCondLst>
+                            <p:childTnLst>
+                              <p:par>
+                                <p:cTn id="5" presetID="1" presetClass="exit" presetSubtype="0" fill="hold" nodeType="clickEffect">
+                                  <p:stCondLst>
+                                    <p:cond delay="0"/>
+                                  </p:stCondLst>
+                                  <p:childTnLst>
+                                    <p:set>
+                                      <p:cBhvr>
+                                        <p:cTn id="6" dur="1" fill="hold">
+                                          <p:stCondLst>
+                                            <p:cond delay="0"/>
+                                          </p:stCondLst>
+                                        </p:cTn>
+                                        <p:tgtEl>
+                                          <p:spTgt spid="3"/>
+                                        </p:tgtEl>
+                                        <p:attrNameLst>
+                                          <p:attrName>style.visibility</p:attrName>
+                                        </p:attrNameLst>
+                                      </p:cBhvr>
+                                      <p:to>
+                                        <p:strVal val="hidden"/>
+                                      </p:to>
+                                    </p:set>
+                                  </p:childTnLst>
+                                </p:cTn>
+                              </p:par>
+                              <p:par>
+                                <p:cTn id="7" presetID="1" presetClass="exit" presetSubtype="0" fill="hold" grpId="0" nodeType="withEffect">
+                                  <p:stCondLst>
+                                    <p:cond delay="0"/>
+                                  </p:stCondLst>
+                                  <p:childTnLst>
+                                    <p:set>
+                                      <p:cBhvr>
+                                        <p:cTn id="8" dur="1" fill="hold">
+                                          <p:stCondLst>
+                                            <p:cond delay="0"/>
+                                          </p:stCondLst>
+                                        </p:cTn>
+                                        <p:tgtEl>
+                                          <p:spTgt spid="11"/>
+                                        </p:tgtEl>
+                                        <p:attrNameLst>
+                                          <p:attrName>style.visibility</p:attrName>
+                                        </p:attrNameLst>
+                                      </p:cBhvr>
+                                      <p:to>
+                                        <p:strVal val="hidden"/>
+                                      </p:to>
+                                    </p:set>
+                                  </p:childTnLst>
+                                </p:cTn>
+                              </p:par>
+                              <p:par>
+                                <p:cTn id="9" presetID="1" presetClass="exit" presetSubtype="0" fill="hold" grpId="0" nodeType="withEffect">
+                                  <p:stCondLst>
+                                    <p:cond delay="0"/>
+                                  </p:stCondLst>
+                                  <p:childTnLst>
+                                    <p:set>
+                                      <p:cBhvr>
+                                        <p:cTn id="10" dur="1" fill="hold">
+                                          <p:stCondLst>
+                                            <p:cond delay="0"/>
+                                          </p:stCondLst>
+                                        </p:cTn>
+                                        <p:tgtEl>
+                                          <p:spTgt spid="12"/>
+                                        </p:tgtEl>
+                                        <p:attrNameLst>
+                                          <p:attrName>style.visibility</p:attrName>
+                                        </p:attrNameLst>
+                                      </p:cBhvr>
+                                      <p:to>
+                                        <p:strVal val="hidden"/>
+                                      </p:to>
+                                    </p:set>
+                                  </p:childTnLst>
+                                </p:cTn>
+                              </p:par>
+                            </p:childTnLst>
+                          </p:cTn>
+                        </p:par>
+                      </p:childTnLst>
+                    </p:cTn>
+                  </p:par>
+                </p:childTnLst>
+              </p:cTn>
+              <p:prevCondLst>
+                <p:cond evt="onPrev" delay="0">
+                  <p:tgtEl>
+                    <p:sldTgt/>
+                  </p:tgtEl>
+                </p:cond>
+              </p:prevCondLst>
+              <p:nextCondLst>
+                <p:cond evt="onNext" delay="0">
+                  <p:tgtEl>
+                    <p:sldTgt/>
+                  </p:tgtEl>
+                </p:cond>
+              </p:nextCondLst>
+            </p:seq>
+          </p:childTnLst>
+        </p:cTn>
       </p:par>
     </p:tnLst>
+    <p:bldLst>
+      <p:bldP spid="11" grpId="0"/>
+      <p:bldP spid="12" grpId="0"/>
+    </p:bldLst>
   </p:timing>
 </p:sld>
 </file>
@@ -10268,7 +10643,7 @@
     </p:spTree>
     <p:extLst>
       <p:ext uri="{BB962C8B-B14F-4D97-AF65-F5344CB8AC3E}">
-        <p14:creationId xmlns:p14="http://schemas.microsoft.com/office/powerpoint/2010/main" xmlns="" val="3598067464"/>
+        <p14:creationId xmlns="" xmlns:p14="http://schemas.microsoft.com/office/powerpoint/2010/main" val="3598067464"/>
       </p:ext>
     </p:extLst>
   </p:cSld>
@@ -11130,7 +11505,7 @@
     </p:spTree>
     <p:extLst>
       <p:ext uri="{BB962C8B-B14F-4D97-AF65-F5344CB8AC3E}">
-        <p14:creationId xmlns:p14="http://schemas.microsoft.com/office/powerpoint/2010/main" xmlns="" val="2895042021"/>
+        <p14:creationId xmlns="" xmlns:p14="http://schemas.microsoft.com/office/powerpoint/2010/main" val="2895042021"/>
       </p:ext>
     </p:extLst>
   </p:cSld>
@@ -11633,7 +12008,7 @@
           <a:blip r:embed="rId2">
             <a:extLst>
               <a:ext uri="{28A0092B-C50C-407E-A947-70E740481C1C}">
-                <a14:useLocalDpi xmlns:a14="http://schemas.microsoft.com/office/drawing/2010/main" xmlns="" val="0"/>
+                <a14:useLocalDpi xmlns="" xmlns:a14="http://schemas.microsoft.com/office/drawing/2010/main" val="0"/>
               </a:ext>
             </a:extLst>
           </a:blip>
@@ -11656,14 +12031,14 @@
           </a:ln>
           <a:extLst>
             <a:ext uri="{909E8E84-426E-40DD-AFC4-6F175D3DCCD1}">
-              <a14:hiddenFill xmlns:a14="http://schemas.microsoft.com/office/drawing/2010/main" xmlns="">
+              <a14:hiddenFill xmlns="" xmlns:a14="http://schemas.microsoft.com/office/drawing/2010/main">
                 <a:solidFill>
                   <a:schemeClr val="accent1"/>
                 </a:solidFill>
               </a14:hiddenFill>
             </a:ext>
             <a:ext uri="{91240B29-F687-4F45-9708-019B960494DF}">
-              <a14:hiddenLine xmlns:a14="http://schemas.microsoft.com/office/drawing/2010/main" xmlns="" w="9525">
+              <a14:hiddenLine xmlns="" xmlns:a14="http://schemas.microsoft.com/office/drawing/2010/main" w="9525">
                 <a:solidFill>
                   <a:schemeClr val="tx1"/>
                 </a:solidFill>
@@ -11800,7 +12175,7 @@
             <a:blip r:embed="rId3">
               <a:extLst>
                 <a:ext uri="{28A0092B-C50C-407E-A947-70E740481C1C}">
-                  <a14:useLocalDpi xmlns:a14="http://schemas.microsoft.com/office/drawing/2010/main" xmlns="" val="0"/>
+                  <a14:useLocalDpi xmlns="" xmlns:a14="http://schemas.microsoft.com/office/drawing/2010/main" val="0"/>
                 </a:ext>
               </a:extLst>
             </a:blip>
@@ -11823,14 +12198,14 @@
             </a:ln>
             <a:extLst>
               <a:ext uri="{909E8E84-426E-40DD-AFC4-6F175D3DCCD1}">
-                <a14:hiddenFill xmlns:a14="http://schemas.microsoft.com/office/drawing/2010/main" xmlns="">
+                <a14:hiddenFill xmlns="" xmlns:a14="http://schemas.microsoft.com/office/drawing/2010/main">
                   <a:solidFill>
                     <a:schemeClr val="accent1"/>
                   </a:solidFill>
                 </a14:hiddenFill>
               </a:ext>
               <a:ext uri="{91240B29-F687-4F45-9708-019B960494DF}">
-                <a14:hiddenLine xmlns:a14="http://schemas.microsoft.com/office/drawing/2010/main" xmlns="" w="9525">
+                <a14:hiddenLine xmlns="" xmlns:a14="http://schemas.microsoft.com/office/drawing/2010/main" w="9525">
                   <a:solidFill>
                     <a:schemeClr val="tx1"/>
                   </a:solidFill>
@@ -11854,7 +12229,7 @@
             <a:blip r:embed="rId4">
               <a:extLst>
                 <a:ext uri="{28A0092B-C50C-407E-A947-70E740481C1C}">
-                  <a14:useLocalDpi xmlns:a14="http://schemas.microsoft.com/office/drawing/2010/main" xmlns="" val="0"/>
+                  <a14:useLocalDpi xmlns="" xmlns:a14="http://schemas.microsoft.com/office/drawing/2010/main" val="0"/>
                 </a:ext>
               </a:extLst>
             </a:blip>
@@ -11877,14 +12252,14 @@
             </a:ln>
             <a:extLst>
               <a:ext uri="{909E8E84-426E-40DD-AFC4-6F175D3DCCD1}">
-                <a14:hiddenFill xmlns:a14="http://schemas.microsoft.com/office/drawing/2010/main" xmlns="">
+                <a14:hiddenFill xmlns="" xmlns:a14="http://schemas.microsoft.com/office/drawing/2010/main">
                   <a:solidFill>
                     <a:schemeClr val="accent1"/>
                   </a:solidFill>
                 </a14:hiddenFill>
               </a:ext>
               <a:ext uri="{91240B29-F687-4F45-9708-019B960494DF}">
-                <a14:hiddenLine xmlns:a14="http://schemas.microsoft.com/office/drawing/2010/main" xmlns="" w="9525">
+                <a14:hiddenLine xmlns="" xmlns:a14="http://schemas.microsoft.com/office/drawing/2010/main" w="9525">
                   <a:solidFill>
                     <a:schemeClr val="tx1"/>
                   </a:solidFill>
@@ -11900,7 +12275,7 @@
     </p:spTree>
     <p:extLst>
       <p:ext uri="{BB962C8B-B14F-4D97-AF65-F5344CB8AC3E}">
-        <p14:creationId xmlns:p14="http://schemas.microsoft.com/office/powerpoint/2010/main" xmlns="" val="1443667910"/>
+        <p14:creationId xmlns="" xmlns:p14="http://schemas.microsoft.com/office/powerpoint/2010/main" val="1443667910"/>
       </p:ext>
     </p:extLst>
   </p:cSld>
@@ -12281,7 +12656,7 @@
           <a:blip r:embed="rId2">
             <a:extLst>
               <a:ext uri="{28A0092B-C50C-407E-A947-70E740481C1C}">
-                <a14:useLocalDpi xmlns:a14="http://schemas.microsoft.com/office/drawing/2010/main" xmlns="" val="0"/>
+                <a14:useLocalDpi xmlns="" xmlns:a14="http://schemas.microsoft.com/office/drawing/2010/main" val="0"/>
               </a:ext>
             </a:extLst>
           </a:blip>
@@ -12304,14 +12679,14 @@
           </a:ln>
           <a:extLst>
             <a:ext uri="{909E8E84-426E-40DD-AFC4-6F175D3DCCD1}">
-              <a14:hiddenFill xmlns:a14="http://schemas.microsoft.com/office/drawing/2010/main" xmlns="">
+              <a14:hiddenFill xmlns="" xmlns:a14="http://schemas.microsoft.com/office/drawing/2010/main">
                 <a:solidFill>
                   <a:schemeClr val="accent1"/>
                 </a:solidFill>
               </a14:hiddenFill>
             </a:ext>
             <a:ext uri="{91240B29-F687-4F45-9708-019B960494DF}">
-              <a14:hiddenLine xmlns:a14="http://schemas.microsoft.com/office/drawing/2010/main" xmlns="" w="9525">
+              <a14:hiddenLine xmlns="" xmlns:a14="http://schemas.microsoft.com/office/drawing/2010/main" w="9525">
                 <a:solidFill>
                   <a:schemeClr val="tx1"/>
                 </a:solidFill>
@@ -12480,7 +12855,7 @@
             <a:blip r:embed="rId3">
               <a:extLst>
                 <a:ext uri="{28A0092B-C50C-407E-A947-70E740481C1C}">
-                  <a14:useLocalDpi xmlns:a14="http://schemas.microsoft.com/office/drawing/2010/main" xmlns="" val="0"/>
+                  <a14:useLocalDpi xmlns="" xmlns:a14="http://schemas.microsoft.com/office/drawing/2010/main" val="0"/>
                 </a:ext>
               </a:extLst>
             </a:blip>
@@ -12503,14 +12878,14 @@
             </a:ln>
             <a:extLst>
               <a:ext uri="{909E8E84-426E-40DD-AFC4-6F175D3DCCD1}">
-                <a14:hiddenFill xmlns:a14="http://schemas.microsoft.com/office/drawing/2010/main" xmlns="">
+                <a14:hiddenFill xmlns="" xmlns:a14="http://schemas.microsoft.com/office/drawing/2010/main">
                   <a:solidFill>
                     <a:schemeClr val="accent1"/>
                   </a:solidFill>
                 </a14:hiddenFill>
               </a:ext>
               <a:ext uri="{91240B29-F687-4F45-9708-019B960494DF}">
-                <a14:hiddenLine xmlns:a14="http://schemas.microsoft.com/office/drawing/2010/main" xmlns="" w="9525">
+                <a14:hiddenLine xmlns="" xmlns:a14="http://schemas.microsoft.com/office/drawing/2010/main" w="9525">
                   <a:solidFill>
                     <a:schemeClr val="tx1"/>
                   </a:solidFill>
@@ -12555,7 +12930,7 @@
     </p:spTree>
     <p:extLst>
       <p:ext uri="{BB962C8B-B14F-4D97-AF65-F5344CB8AC3E}">
-        <p14:creationId xmlns:p14="http://schemas.microsoft.com/office/powerpoint/2010/main" xmlns="" val="544419612"/>
+        <p14:creationId xmlns="" xmlns:p14="http://schemas.microsoft.com/office/powerpoint/2010/main" val="544419612"/>
       </p:ext>
     </p:extLst>
   </p:cSld>
@@ -13083,7 +13458,7 @@
           <a:blip r:embed="rId2">
             <a:extLst>
               <a:ext uri="{28A0092B-C50C-407E-A947-70E740481C1C}">
-                <a14:useLocalDpi xmlns:a14="http://schemas.microsoft.com/office/drawing/2010/main" xmlns="" val="0"/>
+                <a14:useLocalDpi xmlns="" xmlns:a14="http://schemas.microsoft.com/office/drawing/2010/main" val="0"/>
               </a:ext>
             </a:extLst>
           </a:blip>
@@ -13106,14 +13481,14 @@
           </a:ln>
           <a:extLst>
             <a:ext uri="{909E8E84-426E-40DD-AFC4-6F175D3DCCD1}">
-              <a14:hiddenFill xmlns:a14="http://schemas.microsoft.com/office/drawing/2010/main" xmlns="">
+              <a14:hiddenFill xmlns="" xmlns:a14="http://schemas.microsoft.com/office/drawing/2010/main">
                 <a:solidFill>
                   <a:schemeClr val="accent1"/>
                 </a:solidFill>
               </a14:hiddenFill>
             </a:ext>
             <a:ext uri="{91240B29-F687-4F45-9708-019B960494DF}">
-              <a14:hiddenLine xmlns:a14="http://schemas.microsoft.com/office/drawing/2010/main" xmlns="" w="9525">
+              <a14:hiddenLine xmlns="" xmlns:a14="http://schemas.microsoft.com/office/drawing/2010/main" w="9525">
                 <a:solidFill>
                   <a:schemeClr val="tx1"/>
                 </a:solidFill>
@@ -13137,7 +13512,7 @@
           <a:blip r:embed="rId3">
             <a:extLst>
               <a:ext uri="{28A0092B-C50C-407E-A947-70E740481C1C}">
-                <a14:useLocalDpi xmlns:a14="http://schemas.microsoft.com/office/drawing/2010/main" xmlns="" val="0"/>
+                <a14:useLocalDpi xmlns="" xmlns:a14="http://schemas.microsoft.com/office/drawing/2010/main" val="0"/>
               </a:ext>
             </a:extLst>
           </a:blip>
@@ -13160,14 +13535,14 @@
           </a:ln>
           <a:extLst>
             <a:ext uri="{909E8E84-426E-40DD-AFC4-6F175D3DCCD1}">
-              <a14:hiddenFill xmlns:a14="http://schemas.microsoft.com/office/drawing/2010/main" xmlns="">
+              <a14:hiddenFill xmlns="" xmlns:a14="http://schemas.microsoft.com/office/drawing/2010/main">
                 <a:solidFill>
                   <a:schemeClr val="accent1"/>
                 </a:solidFill>
               </a14:hiddenFill>
             </a:ext>
             <a:ext uri="{91240B29-F687-4F45-9708-019B960494DF}">
-              <a14:hiddenLine xmlns:a14="http://schemas.microsoft.com/office/drawing/2010/main" xmlns="" w="9525">
+              <a14:hiddenLine xmlns="" xmlns:a14="http://schemas.microsoft.com/office/drawing/2010/main" w="9525">
                 <a:solidFill>
                   <a:schemeClr val="tx1"/>
                 </a:solidFill>
@@ -13182,7 +13557,7 @@
     </p:spTree>
     <p:extLst>
       <p:ext uri="{BB962C8B-B14F-4D97-AF65-F5344CB8AC3E}">
-        <p14:creationId xmlns:p14="http://schemas.microsoft.com/office/powerpoint/2010/main" xmlns="" val="2002502998"/>
+        <p14:creationId xmlns="" xmlns:p14="http://schemas.microsoft.com/office/powerpoint/2010/main" val="2002502998"/>
       </p:ext>
     </p:extLst>
   </p:cSld>
@@ -14536,7 +14911,7 @@
             <a:blip r:embed="rId2">
               <a:extLst>
                 <a:ext uri="{28A0092B-C50C-407E-A947-70E740481C1C}">
-                  <a14:useLocalDpi xmlns:a14="http://schemas.microsoft.com/office/drawing/2010/main" xmlns="" val="0"/>
+                  <a14:useLocalDpi xmlns="" xmlns:a14="http://schemas.microsoft.com/office/drawing/2010/main" val="0"/>
                 </a:ext>
               </a:extLst>
             </a:blip>
@@ -14559,7 +14934,7 @@
             </a:ln>
             <a:extLst>
               <a:ext uri="{91240B29-F687-4F45-9708-019B960494DF}">
-                <a14:hiddenLine xmlns:a14="http://schemas.microsoft.com/office/drawing/2010/main" xmlns="" w="9525">
+                <a14:hiddenLine xmlns="" xmlns:a14="http://schemas.microsoft.com/office/drawing/2010/main" w="9525">
                   <a:solidFill>
                     <a:schemeClr val="tx1"/>
                   </a:solidFill>
@@ -14575,7 +14950,7 @@
     </p:spTree>
     <p:extLst>
       <p:ext uri="{BB962C8B-B14F-4D97-AF65-F5344CB8AC3E}">
-        <p14:creationId xmlns:p14="http://schemas.microsoft.com/office/powerpoint/2010/main" xmlns="" val="2850896358"/>
+        <p14:creationId xmlns="" xmlns:p14="http://schemas.microsoft.com/office/powerpoint/2010/main" val="2850896358"/>
       </p:ext>
     </p:extLst>
   </p:cSld>
@@ -18781,7 +19156,7 @@
     </p:spTree>
     <p:extLst>
       <p:ext uri="{BB962C8B-B14F-4D97-AF65-F5344CB8AC3E}">
-        <p14:creationId xmlns:p14="http://schemas.microsoft.com/office/powerpoint/2010/main" xmlns="" val="1179663467"/>
+        <p14:creationId xmlns="" xmlns:p14="http://schemas.microsoft.com/office/powerpoint/2010/main" val="1179663467"/>
       </p:ext>
     </p:extLst>
   </p:cSld>
@@ -20270,7 +20645,7 @@
             <a:blip r:embed="rId2">
               <a:extLst>
                 <a:ext uri="{28A0092B-C50C-407E-A947-70E740481C1C}">
-                  <a14:useLocalDpi xmlns:a14="http://schemas.microsoft.com/office/drawing/2010/main" xmlns="" val="0"/>
+                  <a14:useLocalDpi xmlns="" xmlns:a14="http://schemas.microsoft.com/office/drawing/2010/main" val="0"/>
                 </a:ext>
               </a:extLst>
             </a:blip>
@@ -20293,14 +20668,14 @@
             </a:ln>
             <a:extLst>
               <a:ext uri="{909E8E84-426E-40DD-AFC4-6F175D3DCCD1}">
-                <a14:hiddenFill xmlns:a14="http://schemas.microsoft.com/office/drawing/2010/main" xmlns="">
+                <a14:hiddenFill xmlns="" xmlns:a14="http://schemas.microsoft.com/office/drawing/2010/main">
                   <a:solidFill>
                     <a:schemeClr val="accent1"/>
                   </a:solidFill>
                 </a14:hiddenFill>
               </a:ext>
               <a:ext uri="{91240B29-F687-4F45-9708-019B960494DF}">
-                <a14:hiddenLine xmlns:a14="http://schemas.microsoft.com/office/drawing/2010/main" xmlns="" w="9525">
+                <a14:hiddenLine xmlns="" xmlns:a14="http://schemas.microsoft.com/office/drawing/2010/main" w="9525">
                   <a:solidFill>
                     <a:schemeClr val="tx1"/>
                   </a:solidFill>
@@ -20324,7 +20699,7 @@
             <a:blip r:embed="rId3">
               <a:extLst>
                 <a:ext uri="{28A0092B-C50C-407E-A947-70E740481C1C}">
-                  <a14:useLocalDpi xmlns:a14="http://schemas.microsoft.com/office/drawing/2010/main" xmlns="" val="0"/>
+                  <a14:useLocalDpi xmlns="" xmlns:a14="http://schemas.microsoft.com/office/drawing/2010/main" val="0"/>
                 </a:ext>
               </a:extLst>
             </a:blip>
@@ -20347,14 +20722,14 @@
             </a:ln>
             <a:extLst>
               <a:ext uri="{909E8E84-426E-40DD-AFC4-6F175D3DCCD1}">
-                <a14:hiddenFill xmlns:a14="http://schemas.microsoft.com/office/drawing/2010/main" xmlns="">
+                <a14:hiddenFill xmlns="" xmlns:a14="http://schemas.microsoft.com/office/drawing/2010/main">
                   <a:solidFill>
                     <a:schemeClr val="accent1"/>
                   </a:solidFill>
                 </a14:hiddenFill>
               </a:ext>
               <a:ext uri="{91240B29-F687-4F45-9708-019B960494DF}">
-                <a14:hiddenLine xmlns:a14="http://schemas.microsoft.com/office/drawing/2010/main" xmlns="" w="9525">
+                <a14:hiddenLine xmlns="" xmlns:a14="http://schemas.microsoft.com/office/drawing/2010/main" w="9525">
                   <a:solidFill>
                     <a:schemeClr val="tx1"/>
                   </a:solidFill>
@@ -20439,7 +20814,7 @@
             <a:blip r:embed="rId4">
               <a:extLst>
                 <a:ext uri="{28A0092B-C50C-407E-A947-70E740481C1C}">
-                  <a14:useLocalDpi xmlns:a14="http://schemas.microsoft.com/office/drawing/2010/main" xmlns="" val="0"/>
+                  <a14:useLocalDpi xmlns="" xmlns:a14="http://schemas.microsoft.com/office/drawing/2010/main" val="0"/>
                 </a:ext>
               </a:extLst>
             </a:blip>
@@ -20462,14 +20837,14 @@
             </a:ln>
             <a:extLst>
               <a:ext uri="{909E8E84-426E-40DD-AFC4-6F175D3DCCD1}">
-                <a14:hiddenFill xmlns:a14="http://schemas.microsoft.com/office/drawing/2010/main" xmlns="">
+                <a14:hiddenFill xmlns="" xmlns:a14="http://schemas.microsoft.com/office/drawing/2010/main">
                   <a:solidFill>
                     <a:schemeClr val="accent1"/>
                   </a:solidFill>
                 </a14:hiddenFill>
               </a:ext>
               <a:ext uri="{91240B29-F687-4F45-9708-019B960494DF}">
-                <a14:hiddenLine xmlns:a14="http://schemas.microsoft.com/office/drawing/2010/main" xmlns="" w="9525">
+                <a14:hiddenLine xmlns="" xmlns:a14="http://schemas.microsoft.com/office/drawing/2010/main" w="9525">
                   <a:solidFill>
                     <a:schemeClr val="tx1"/>
                   </a:solidFill>
@@ -20638,7 +21013,7 @@
     </p:spTree>
     <p:extLst>
       <p:ext uri="{BB962C8B-B14F-4D97-AF65-F5344CB8AC3E}">
-        <p14:creationId xmlns:p14="http://schemas.microsoft.com/office/powerpoint/2010/main" xmlns="" val="2167710447"/>
+        <p14:creationId xmlns="" xmlns:p14="http://schemas.microsoft.com/office/powerpoint/2010/main" val="2167710447"/>
       </p:ext>
     </p:extLst>
   </p:cSld>
@@ -21959,23 +22334,6 @@
 </file>
 
 <file path=customXml/item1.xml><?xml version="1.0" encoding="utf-8"?>
-<p:properties xmlns:p="http://schemas.microsoft.com/office/2006/metadata/properties" xmlns:xsi="http://www.w3.org/2001/XMLSchema-instance" xmlns:pc="http://schemas.microsoft.com/office/infopath/2007/PartnerControls">
-  <documentManagement>
-    <Year xmlns="24ac9ee2-1f69-49ec-81c1-d01c86227436">2015</Year>
-  </documentManagement>
-</p:properties>
-</file>
-
-<file path=customXml/item2.xml><?xml version="1.0" encoding="utf-8"?>
-<?mso-contentType ?>
-<FormTemplates xmlns="http://schemas.microsoft.com/sharepoint/v3/contenttype/forms">
-  <Display>DocumentLibraryForm</Display>
-  <Edit>DocumentLibraryForm</Edit>
-  <New>DocumentLibraryForm</New>
-</FormTemplates>
-</file>
-
-<file path=customXml/item3.xml><?xml version="1.0" encoding="utf-8"?>
 <ct:contentTypeSchema xmlns:ct="http://schemas.microsoft.com/office/2006/metadata/contentType" xmlns:ma="http://schemas.microsoft.com/office/2006/metadata/properties/metaAttributes" ct:_="" ma:_="" ma:contentTypeName="文件" ma:contentTypeID="0x0101000CB458D5399432479E0BB962A3AC807C" ma:contentTypeVersion="1" ma:contentTypeDescription="建立新的文件。" ma:contentTypeScope="" ma:versionID="2090fcdc2e9aae8469eabc8d31b189fb">
   <xsd:schema xmlns:xsd="http://www.w3.org/2001/XMLSchema" xmlns:xs="http://www.w3.org/2001/XMLSchema" xmlns:p="http://schemas.microsoft.com/office/2006/metadata/properties" xmlns:ns2="24ac9ee2-1f69-49ec-81c1-d01c86227436" targetNamespace="http://schemas.microsoft.com/office/2006/metadata/properties" ma:root="true" ma:fieldsID="3ada4ee18b918396c161ab8726fa03da" ns2:_="">
     <xsd:import namespace="24ac9ee2-1f69-49ec-81c1-d01c86227436"/>
@@ -22106,31 +22464,24 @@
 </ct:contentTypeSchema>
 </file>
 
-<file path=customXml/itemProps1.xml><?xml version="1.0" encoding="utf-8"?>
-<ds:datastoreItem xmlns:ds="http://schemas.openxmlformats.org/officeDocument/2006/customXml" ds:itemID="{327D2673-F33E-4BA5-8F43-8D9B5FEBC44E}">
-  <ds:schemaRefs>
-    <ds:schemaRef ds:uri="http://schemas.microsoft.com/office/2006/documentManagement/types"/>
-    <ds:schemaRef ds:uri="http://schemas.microsoft.com/office/2006/metadata/properties"/>
-    <ds:schemaRef ds:uri="http://purl.org/dc/dcmitype/"/>
-    <ds:schemaRef ds:uri="http://purl.org/dc/terms/"/>
-    <ds:schemaRef ds:uri="http://schemas.microsoft.com/office/infopath/2007/PartnerControls"/>
-    <ds:schemaRef ds:uri="http://purl.org/dc/elements/1.1/"/>
-    <ds:schemaRef ds:uri="http://www.w3.org/XML/1998/namespace"/>
-    <ds:schemaRef ds:uri="http://schemas.openxmlformats.org/package/2006/metadata/core-properties"/>
-    <ds:schemaRef ds:uri="24ac9ee2-1f69-49ec-81c1-d01c86227436"/>
-  </ds:schemaRefs>
-</ds:datastoreItem>
+<file path=customXml/item2.xml><?xml version="1.0" encoding="utf-8"?>
+<?mso-contentType ?>
+<FormTemplates xmlns="http://schemas.microsoft.com/sharepoint/v3/contenttype/forms">
+  <Display>DocumentLibraryForm</Display>
+  <Edit>DocumentLibraryForm</Edit>
+  <New>DocumentLibraryForm</New>
+</FormTemplates>
 </file>
 
-<file path=customXml/itemProps2.xml><?xml version="1.0" encoding="utf-8"?>
-<ds:datastoreItem xmlns:ds="http://schemas.openxmlformats.org/officeDocument/2006/customXml" ds:itemID="{75703042-9C6F-440D-9A8D-0836740E8EC4}">
-  <ds:schemaRefs>
-    <ds:schemaRef ds:uri="http://schemas.microsoft.com/sharepoint/v3/contenttype/forms"/>
-  </ds:schemaRefs>
-</ds:datastoreItem>
+<file path=customXml/item3.xml><?xml version="1.0" encoding="utf-8"?>
+<p:properties xmlns:p="http://schemas.microsoft.com/office/2006/metadata/properties" xmlns:xsi="http://www.w3.org/2001/XMLSchema-instance" xmlns:pc="http://schemas.microsoft.com/office/infopath/2007/PartnerControls">
+  <documentManagement>
+    <Year xmlns="24ac9ee2-1f69-49ec-81c1-d01c86227436">2015</Year>
+  </documentManagement>
+</p:properties>
 </file>
 
-<file path=customXml/itemProps3.xml><?xml version="1.0" encoding="utf-8"?>
+<file path=customXml/itemProps1.xml><?xml version="1.0" encoding="utf-8"?>
 <ds:datastoreItem xmlns:ds="http://schemas.openxmlformats.org/officeDocument/2006/customXml" ds:itemID="{4C9F39EC-CE5D-4921-B7BB-5650597DBD03}">
   <ds:schemaRefs>
     <ds:schemaRef ds:uri="http://schemas.microsoft.com/office/2006/metadata/contentType"/>
@@ -22146,4 +22497,28 @@
     <ds:schemaRef ds:uri="http://schemas.microsoft.com/internal/obd"/>
   </ds:schemaRefs>
 </ds:datastoreItem>
+</file>
+
+<file path=customXml/itemProps2.xml><?xml version="1.0" encoding="utf-8"?>
+<ds:datastoreItem xmlns:ds="http://schemas.openxmlformats.org/officeDocument/2006/customXml" ds:itemID="{75703042-9C6F-440D-9A8D-0836740E8EC4}">
+  <ds:schemaRefs>
+    <ds:schemaRef ds:uri="http://schemas.microsoft.com/sharepoint/v3/contenttype/forms"/>
+  </ds:schemaRefs>
+</ds:datastoreItem>
+</file>
+
+<file path=customXml/itemProps3.xml><?xml version="1.0" encoding="utf-8"?>
+<ds:datastoreItem xmlns:ds="http://schemas.openxmlformats.org/officeDocument/2006/customXml" ds:itemID="{327D2673-F33E-4BA5-8F43-8D9B5FEBC44E}">
+  <ds:schemaRefs>
+    <ds:schemaRef ds:uri="http://schemas.microsoft.com/office/2006/documentManagement/types"/>
+    <ds:schemaRef ds:uri="http://schemas.microsoft.com/office/2006/metadata/properties"/>
+    <ds:schemaRef ds:uri="http://purl.org/dc/dcmitype/"/>
+    <ds:schemaRef ds:uri="http://purl.org/dc/terms/"/>
+    <ds:schemaRef ds:uri="http://schemas.microsoft.com/office/infopath/2007/PartnerControls"/>
+    <ds:schemaRef ds:uri="http://purl.org/dc/elements/1.1/"/>
+    <ds:schemaRef ds:uri="http://www.w3.org/XML/1998/namespace"/>
+    <ds:schemaRef ds:uri="http://schemas.openxmlformats.org/package/2006/metadata/core-properties"/>
+    <ds:schemaRef ds:uri="24ac9ee2-1f69-49ec-81c1-d01c86227436"/>
+  </ds:schemaRefs>
+</ds:datastoreItem>
 </file>
</xml_diff>